<commit_message>
Comment chart creation code
</commit_message>
<xml_diff>
--- a/FlaskApp/static/generated/51Test1.pptx
+++ b/FlaskApp/static/generated/51Test1.pptx
@@ -4244,6 +4244,19 @@
                     <a:p>
                       <a:r>
                         <a:rPr sz="1600"/>
+                        <a:t>Corporate</a:t>
+                      </a:r>
+                    </a:p>
+                  </a:txBody>
+                  <a:tcPr/>
+                </a:tc>
+                <a:tc>
+                  <a:txBody>
+                    <a:bodyPr/>
+                    <a:lstStyle/>
+                    <a:p>
+                      <a:r>
+                        <a:rPr sz="1600"/>
                         <a:t>Seml</a:t>
                       </a:r>
                     </a:p>
@@ -4257,46 +4270,33 @@
                     <a:p>
                       <a:r>
                         <a:rPr sz="1600"/>
-                        <a:t>Spg</a:t>
-                      </a:r>
-                    </a:p>
-                  </a:txBody>
-                  <a:tcPr/>
-                </a:tc>
-                <a:tc>
-                  <a:txBody>
-                    <a:bodyPr/>
-                    <a:lstStyle/>
-                    <a:p>
-                      <a:r>
-                        <a:rPr sz="1600"/>
-                        <a:t>Corporate</a:t>
-                      </a:r>
-                    </a:p>
-                  </a:txBody>
-                  <a:tcPr/>
-                </a:tc>
-                <a:tc>
-                  <a:txBody>
-                    <a:bodyPr/>
-                    <a:lstStyle/>
-                    <a:p>
-                      <a:r>
-                        <a:rPr sz="1600"/>
-                        <a:t>R&amp;d</a:t>
-                      </a:r>
-                    </a:p>
-                  </a:txBody>
-                  <a:tcPr/>
-                </a:tc>
-                <a:tc>
-                  <a:txBody>
-                    <a:bodyPr/>
-                    <a:lstStyle/>
-                    <a:p>
-                      <a:r>
-                        <a:rPr sz="1600"/>
-                        <a:t>Pondy formulations</a:t>
+                        <a:t>Other</a:t>
+                      </a:r>
+                    </a:p>
+                  </a:txBody>
+                  <a:tcPr/>
+                </a:tc>
+                <a:tc>
+                  <a:txBody>
+                    <a:bodyPr/>
+                    <a:lstStyle/>
+                    <a:p>
+                      <a:r>
+                        <a:rPr sz="1600"/>
+                        <a:t>Ucl</a:t>
+                      </a:r>
+                    </a:p>
+                  </a:txBody>
+                  <a:tcPr/>
+                </a:tc>
+                <a:tc>
+                  <a:txBody>
+                    <a:bodyPr/>
+                    <a:lstStyle/>
+                    <a:p>
+                      <a:r>
+                        <a:rPr sz="1600"/>
+                        <a:t>Alathur</a:t>
                       </a:r>
                     </a:p>
                   </a:txBody>
@@ -4324,6 +4324,19 @@
                     <a:p>
                       <a:r>
                         <a:rPr sz="1600"/>
+                        <a:t>13%</a:t>
+                      </a:r>
+                    </a:p>
+                  </a:txBody>
+                  <a:tcPr/>
+                </a:tc>
+                <a:tc>
+                  <a:txBody>
+                    <a:bodyPr/>
+                    <a:lstStyle/>
+                    <a:p>
+                      <a:r>
+                        <a:rPr sz="1600"/>
                         <a:t>44%</a:t>
                       </a:r>
                     </a:p>
@@ -4350,33 +4363,20 @@
                     <a:p>
                       <a:r>
                         <a:rPr sz="1600"/>
-                        <a:t>13%</a:t>
-                      </a:r>
-                    </a:p>
-                  </a:txBody>
-                  <a:tcPr/>
-                </a:tc>
-                <a:tc>
-                  <a:txBody>
-                    <a:bodyPr/>
-                    <a:lstStyle/>
-                    <a:p>
-                      <a:r>
-                        <a:rPr sz="1600"/>
-                        <a:t>31%</a:t>
-                      </a:r>
-                    </a:p>
-                  </a:txBody>
-                  <a:tcPr/>
-                </a:tc>
-                <a:tc>
-                  <a:txBody>
-                    <a:bodyPr/>
-                    <a:lstStyle/>
-                    <a:p>
-                      <a:r>
-                        <a:rPr sz="1600"/>
-                        <a:t>33%</a:t>
+                        <a:t>50%</a:t>
+                      </a:r>
+                    </a:p>
+                  </a:txBody>
+                  <a:tcPr/>
+                </a:tc>
+                <a:tc>
+                  <a:txBody>
+                    <a:bodyPr/>
+                    <a:lstStyle/>
+                    <a:p>
+                      <a:r>
+                        <a:rPr sz="1600"/>
+                        <a:t>27%</a:t>
                       </a:r>
                     </a:p>
                   </a:txBody>
@@ -4404,6 +4404,19 @@
                     <a:p>
                       <a:r>
                         <a:rPr sz="1600"/>
+                        <a:t>20%</a:t>
+                      </a:r>
+                    </a:p>
+                  </a:txBody>
+                  <a:tcPr/>
+                </a:tc>
+                <a:tc>
+                  <a:txBody>
+                    <a:bodyPr/>
+                    <a:lstStyle/>
+                    <a:p>
+                      <a:r>
+                        <a:rPr sz="1600"/>
                         <a:t>6%</a:t>
                       </a:r>
                     </a:p>
@@ -4430,33 +4443,20 @@
                     <a:p>
                       <a:r>
                         <a:rPr sz="1600"/>
-                        <a:t>20%</a:t>
-                      </a:r>
-                    </a:p>
-                  </a:txBody>
-                  <a:tcPr/>
-                </a:tc>
-                <a:tc>
-                  <a:txBody>
-                    <a:bodyPr/>
-                    <a:lstStyle/>
-                    <a:p>
-                      <a:r>
-                        <a:rPr sz="1600"/>
-                        <a:t>28%</a:t>
-                      </a:r>
-                    </a:p>
-                  </a:txBody>
-                  <a:tcPr/>
-                </a:tc>
-                <a:tc>
-                  <a:txBody>
-                    <a:bodyPr/>
-                    <a:lstStyle/>
-                    <a:p>
-                      <a:r>
-                        <a:rPr sz="1600"/>
-                        <a:t>20%</a:t>
+                        <a:t>0%</a:t>
+                      </a:r>
+                    </a:p>
+                  </a:txBody>
+                  <a:tcPr/>
+                </a:tc>
+                <a:tc>
+                  <a:txBody>
+                    <a:bodyPr/>
+                    <a:lstStyle/>
+                    <a:p>
+                      <a:r>
+                        <a:rPr sz="1600"/>
+                        <a:t>18%</a:t>
                       </a:r>
                     </a:p>
                   </a:txBody>
@@ -4484,6 +4484,19 @@
                     <a:p>
                       <a:r>
                         <a:rPr sz="1600"/>
+                        <a:t>40%</a:t>
+                      </a:r>
+                    </a:p>
+                  </a:txBody>
+                  <a:tcPr/>
+                </a:tc>
+                <a:tc>
+                  <a:txBody>
+                    <a:bodyPr/>
+                    <a:lstStyle/>
+                    <a:p>
+                      <a:r>
+                        <a:rPr sz="1600"/>
                         <a:t>11%</a:t>
                       </a:r>
                     </a:p>
@@ -4497,6 +4510,19 @@
                     <a:p>
                       <a:r>
                         <a:rPr sz="1600"/>
+                        <a:t>100%</a:t>
+                      </a:r>
+                    </a:p>
+                  </a:txBody>
+                  <a:tcPr/>
+                </a:tc>
+                <a:tc>
+                  <a:txBody>
+                    <a:bodyPr/>
+                    <a:lstStyle/>
+                    <a:p>
+                      <a:r>
+                        <a:rPr sz="1600"/>
                         <a:t>0%</a:t>
                       </a:r>
                     </a:p>
@@ -4510,33 +4536,7 @@
                     <a:p>
                       <a:r>
                         <a:rPr sz="1600"/>
-                        <a:t>40%</a:t>
-                      </a:r>
-                    </a:p>
-                  </a:txBody>
-                  <a:tcPr/>
-                </a:tc>
-                <a:tc>
-                  <a:txBody>
-                    <a:bodyPr/>
-                    <a:lstStyle/>
-                    <a:p>
-                      <a:r>
-                        <a:rPr sz="1600"/>
-                        <a:t>31%</a:t>
-                      </a:r>
-                    </a:p>
-                  </a:txBody>
-                  <a:tcPr/>
-                </a:tc>
-                <a:tc>
-                  <a:txBody>
-                    <a:bodyPr/>
-                    <a:lstStyle/>
-                    <a:p>
-                      <a:r>
-                        <a:rPr sz="1600"/>
-                        <a:t>24%</a:t>
+                        <a:t>36%</a:t>
                       </a:r>
                     </a:p>
                   </a:txBody>
@@ -4564,6 +4564,19 @@
                     <a:p>
                       <a:r>
                         <a:rPr sz="1600"/>
+                        <a:t>7%</a:t>
+                      </a:r>
+                    </a:p>
+                  </a:txBody>
+                  <a:tcPr/>
+                </a:tc>
+                <a:tc>
+                  <a:txBody>
+                    <a:bodyPr/>
+                    <a:lstStyle/>
+                    <a:p>
+                      <a:r>
+                        <a:rPr sz="1600"/>
                         <a:t>17%</a:t>
                       </a:r>
                     </a:p>
@@ -4590,20 +4603,7 @@
                     <a:p>
                       <a:r>
                         <a:rPr sz="1600"/>
-                        <a:t>7%</a:t>
-                      </a:r>
-                    </a:p>
-                  </a:txBody>
-                  <a:tcPr/>
-                </a:tc>
-                <a:tc>
-                  <a:txBody>
-                    <a:bodyPr/>
-                    <a:lstStyle/>
-                    <a:p>
-                      <a:r>
-                        <a:rPr sz="1600"/>
-                        <a:t>6%</a:t>
+                        <a:t>50%</a:t>
                       </a:r>
                     </a:p>
                   </a:txBody>
@@ -4644,6 +4644,19 @@
                     <a:p>
                       <a:r>
                         <a:rPr sz="1600"/>
+                        <a:t>20%</a:t>
+                      </a:r>
+                    </a:p>
+                  </a:txBody>
+                  <a:tcPr/>
+                </a:tc>
+                <a:tc>
+                  <a:txBody>
+                    <a:bodyPr/>
+                    <a:lstStyle/>
+                    <a:p>
+                      <a:r>
+                        <a:rPr sz="1600"/>
                         <a:t>22%</a:t>
                       </a:r>
                     </a:p>
@@ -4670,33 +4683,20 @@
                     <a:p>
                       <a:r>
                         <a:rPr sz="1600"/>
-                        <a:t>20%</a:t>
-                      </a:r>
-                    </a:p>
-                  </a:txBody>
-                  <a:tcPr/>
-                </a:tc>
-                <a:tc>
-                  <a:txBody>
-                    <a:bodyPr/>
-                    <a:lstStyle/>
-                    <a:p>
-                      <a:r>
-                        <a:rPr sz="1600"/>
-                        <a:t>3%</a:t>
-                      </a:r>
-                    </a:p>
-                  </a:txBody>
-                  <a:tcPr/>
-                </a:tc>
-                <a:tc>
-                  <a:txBody>
-                    <a:bodyPr/>
-                    <a:lstStyle/>
-                    <a:p>
-                      <a:r>
-                        <a:rPr sz="1600"/>
-                        <a:t>8%</a:t>
+                        <a:t>0%</a:t>
+                      </a:r>
+                    </a:p>
+                  </a:txBody>
+                  <a:tcPr/>
+                </a:tc>
+                <a:tc>
+                  <a:txBody>
+                    <a:bodyPr/>
+                    <a:lstStyle/>
+                    <a:p>
+                      <a:r>
+                        <a:rPr sz="1600"/>
+                        <a:t>5%</a:t>
                       </a:r>
                     </a:p>
                   </a:txBody>
@@ -4737,7 +4737,7 @@
                     <a:p>
                       <a:r>
                         <a:rPr sz="1600"/>
-                        <a:t>0%</a:t>
+                        <a:t>100%</a:t>
                       </a:r>
                     </a:p>
                   </a:txBody>
@@ -4834,7 +4834,46 @@
                     <a:p>
                       <a:r>
                         <a:rPr sz="1600"/>
-                        <a:t>Ucl</a:t>
+                        <a:t>Spg</a:t>
+                      </a:r>
+                    </a:p>
+                  </a:txBody>
+                  <a:tcPr/>
+                </a:tc>
+                <a:tc>
+                  <a:txBody>
+                    <a:bodyPr/>
+                    <a:lstStyle/>
+                    <a:p>
+                      <a:r>
+                        <a:rPr sz="1600"/>
+                        <a:t>Pondy formulations</a:t>
+                      </a:r>
+                    </a:p>
+                  </a:txBody>
+                  <a:tcPr/>
+                </a:tc>
+                <a:tc>
+                  <a:txBody>
+                    <a:bodyPr/>
+                    <a:lstStyle/>
+                    <a:p>
+                      <a:r>
+                        <a:rPr sz="1600"/>
+                        <a:t>Arcolab</a:t>
+                      </a:r>
+                    </a:p>
+                  </a:txBody>
+                  <a:tcPr/>
+                </a:tc>
+                <a:tc>
+                  <a:txBody>
+                    <a:bodyPr/>
+                    <a:lstStyle/>
+                    <a:p>
+                      <a:r>
+                        <a:rPr sz="1600"/>
+                        <a:t>R&amp;d</a:t>
                       </a:r>
                     </a:p>
                   </a:txBody>
@@ -4848,45 +4887,6 @@
                       <a:r>
                         <a:rPr sz="1600"/>
                         <a:t>Krsg</a:t>
-                      </a:r>
-                    </a:p>
-                  </a:txBody>
-                  <a:tcPr/>
-                </a:tc>
-                <a:tc>
-                  <a:txBody>
-                    <a:bodyPr/>
-                    <a:lstStyle/>
-                    <a:p>
-                      <a:r>
-                        <a:rPr sz="1600"/>
-                        <a:t>Alathur</a:t>
-                      </a:r>
-                    </a:p>
-                  </a:txBody>
-                  <a:tcPr/>
-                </a:tc>
-                <a:tc>
-                  <a:txBody>
-                    <a:bodyPr/>
-                    <a:lstStyle/>
-                    <a:p>
-                      <a:r>
-                        <a:rPr sz="1600"/>
-                        <a:t>Other</a:t>
-                      </a:r>
-                    </a:p>
-                  </a:txBody>
-                  <a:tcPr/>
-                </a:tc>
-                <a:tc>
-                  <a:txBody>
-                    <a:bodyPr/>
-                    <a:lstStyle/>
-                    <a:p>
-                      <a:r>
-                        <a:rPr sz="1600"/>
-                        <a:t>Arcolab</a:t>
                       </a:r>
                     </a:p>
                   </a:txBody>
@@ -4914,7 +4914,46 @@
                     <a:p>
                       <a:r>
                         <a:rPr sz="1600"/>
-                        <a:t>50%</a:t>
+                        <a:t>0%</a:t>
+                      </a:r>
+                    </a:p>
+                  </a:txBody>
+                  <a:tcPr/>
+                </a:tc>
+                <a:tc>
+                  <a:txBody>
+                    <a:bodyPr/>
+                    <a:lstStyle/>
+                    <a:p>
+                      <a:r>
+                        <a:rPr sz="1600"/>
+                        <a:t>33%</a:t>
+                      </a:r>
+                    </a:p>
+                  </a:txBody>
+                  <a:tcPr/>
+                </a:tc>
+                <a:tc>
+                  <a:txBody>
+                    <a:bodyPr/>
+                    <a:lstStyle/>
+                    <a:p>
+                      <a:r>
+                        <a:rPr sz="1600"/>
+                        <a:t>40%</a:t>
+                      </a:r>
+                    </a:p>
+                  </a:txBody>
+                  <a:tcPr/>
+                </a:tc>
+                <a:tc>
+                  <a:txBody>
+                    <a:bodyPr/>
+                    <a:lstStyle/>
+                    <a:p>
+                      <a:r>
+                        <a:rPr sz="1600"/>
+                        <a:t>31%</a:t>
                       </a:r>
                     </a:p>
                   </a:txBody>
@@ -4928,45 +4967,6 @@
                       <a:r>
                         <a:rPr sz="1600"/>
                         <a:t>29%</a:t>
-                      </a:r>
-                    </a:p>
-                  </a:txBody>
-                  <a:tcPr/>
-                </a:tc>
-                <a:tc>
-                  <a:txBody>
-                    <a:bodyPr/>
-                    <a:lstStyle/>
-                    <a:p>
-                      <a:r>
-                        <a:rPr sz="1600"/>
-                        <a:t>27%</a:t>
-                      </a:r>
-                    </a:p>
-                  </a:txBody>
-                  <a:tcPr/>
-                </a:tc>
-                <a:tc>
-                  <a:txBody>
-                    <a:bodyPr/>
-                    <a:lstStyle/>
-                    <a:p>
-                      <a:r>
-                        <a:rPr sz="1600"/>
-                        <a:t>0%</a:t>
-                      </a:r>
-                    </a:p>
-                  </a:txBody>
-                  <a:tcPr/>
-                </a:tc>
-                <a:tc>
-                  <a:txBody>
-                    <a:bodyPr/>
-                    <a:lstStyle/>
-                    <a:p>
-                      <a:r>
-                        <a:rPr sz="1600"/>
-                        <a:t>40%</a:t>
                       </a:r>
                     </a:p>
                   </a:txBody>
@@ -5007,46 +5007,46 @@
                     <a:p>
                       <a:r>
                         <a:rPr sz="1600"/>
+                        <a:t>20%</a:t>
+                      </a:r>
+                    </a:p>
+                  </a:txBody>
+                  <a:tcPr/>
+                </a:tc>
+                <a:tc>
+                  <a:txBody>
+                    <a:bodyPr/>
+                    <a:lstStyle/>
+                    <a:p>
+                      <a:r>
+                        <a:rPr sz="1600"/>
+                        <a:t>20%</a:t>
+                      </a:r>
+                    </a:p>
+                  </a:txBody>
+                  <a:tcPr/>
+                </a:tc>
+                <a:tc>
+                  <a:txBody>
+                    <a:bodyPr/>
+                    <a:lstStyle/>
+                    <a:p>
+                      <a:r>
+                        <a:rPr sz="1600"/>
+                        <a:t>28%</a:t>
+                      </a:r>
+                    </a:p>
+                  </a:txBody>
+                  <a:tcPr/>
+                </a:tc>
+                <a:tc>
+                  <a:txBody>
+                    <a:bodyPr/>
+                    <a:lstStyle/>
+                    <a:p>
+                      <a:r>
+                        <a:rPr sz="1600"/>
                         <a:t>21%</a:t>
-                      </a:r>
-                    </a:p>
-                  </a:txBody>
-                  <a:tcPr/>
-                </a:tc>
-                <a:tc>
-                  <a:txBody>
-                    <a:bodyPr/>
-                    <a:lstStyle/>
-                    <a:p>
-                      <a:r>
-                        <a:rPr sz="1600"/>
-                        <a:t>18%</a:t>
-                      </a:r>
-                    </a:p>
-                  </a:txBody>
-                  <a:tcPr/>
-                </a:tc>
-                <a:tc>
-                  <a:txBody>
-                    <a:bodyPr/>
-                    <a:lstStyle/>
-                    <a:p>
-                      <a:r>
-                        <a:rPr sz="1600"/>
-                        <a:t>0%</a:t>
-                      </a:r>
-                    </a:p>
-                  </a:txBody>
-                  <a:tcPr/>
-                </a:tc>
-                <a:tc>
-                  <a:txBody>
-                    <a:bodyPr/>
-                    <a:lstStyle/>
-                    <a:p>
-                      <a:r>
-                        <a:rPr sz="1600"/>
-                        <a:t>20%</a:t>
                       </a:r>
                     </a:p>
                   </a:txBody>
@@ -5100,33 +5100,33 @@
                     <a:p>
                       <a:r>
                         <a:rPr sz="1600"/>
-                        <a:t>36%</a:t>
-                      </a:r>
-                    </a:p>
-                  </a:txBody>
-                  <a:tcPr/>
-                </a:tc>
-                <a:tc>
-                  <a:txBody>
-                    <a:bodyPr/>
-                    <a:lstStyle/>
-                    <a:p>
-                      <a:r>
-                        <a:rPr sz="1600"/>
-                        <a:t>100%</a:t>
-                      </a:r>
-                    </a:p>
-                  </a:txBody>
-                  <a:tcPr/>
-                </a:tc>
-                <a:tc>
-                  <a:txBody>
-                    <a:bodyPr/>
-                    <a:lstStyle/>
-                    <a:p>
-                      <a:r>
-                        <a:rPr sz="1600"/>
                         <a:t>0%</a:t>
+                      </a:r>
+                    </a:p>
+                  </a:txBody>
+                  <a:tcPr/>
+                </a:tc>
+                <a:tc>
+                  <a:txBody>
+                    <a:bodyPr/>
+                    <a:lstStyle/>
+                    <a:p>
+                      <a:r>
+                        <a:rPr sz="1600"/>
+                        <a:t>31%</a:t>
+                      </a:r>
+                    </a:p>
+                  </a:txBody>
+                  <a:tcPr/>
+                </a:tc>
+                <a:tc>
+                  <a:txBody>
+                    <a:bodyPr/>
+                    <a:lstStyle/>
+                    <a:p>
+                      <a:r>
+                        <a:rPr sz="1600"/>
+                        <a:t>24%</a:t>
                       </a:r>
                     </a:p>
                   </a:txBody>
@@ -5154,7 +5154,7 @@
                     <a:p>
                       <a:r>
                         <a:rPr sz="1600"/>
-                        <a:t>50%</a:t>
+                        <a:t>0%</a:t>
                       </a:r>
                     </a:p>
                   </a:txBody>
@@ -5180,33 +5180,33 @@
                     <a:p>
                       <a:r>
                         <a:rPr sz="1600"/>
+                        <a:t>20%</a:t>
+                      </a:r>
+                    </a:p>
+                  </a:txBody>
+                  <a:tcPr/>
+                </a:tc>
+                <a:tc>
+                  <a:txBody>
+                    <a:bodyPr/>
+                    <a:lstStyle/>
+                    <a:p>
+                      <a:r>
+                        <a:rPr sz="1600"/>
+                        <a:t>6%</a:t>
+                      </a:r>
+                    </a:p>
+                  </a:txBody>
+                  <a:tcPr/>
+                </a:tc>
+                <a:tc>
+                  <a:txBody>
+                    <a:bodyPr/>
+                    <a:lstStyle/>
+                    <a:p>
+                      <a:r>
+                        <a:rPr sz="1600"/>
                         <a:t>14%</a:t>
-                      </a:r>
-                    </a:p>
-                  </a:txBody>
-                  <a:tcPr/>
-                </a:tc>
-                <a:tc>
-                  <a:txBody>
-                    <a:bodyPr/>
-                    <a:lstStyle/>
-                    <a:p>
-                      <a:r>
-                        <a:rPr sz="1600"/>
-                        <a:t>0%</a:t>
-                      </a:r>
-                    </a:p>
-                  </a:txBody>
-                  <a:tcPr/>
-                </a:tc>
-                <a:tc>
-                  <a:txBody>
-                    <a:bodyPr/>
-                    <a:lstStyle/>
-                    <a:p>
-                      <a:r>
-                        <a:rPr sz="1600"/>
-                        <a:t>20%</a:t>
                       </a:r>
                     </a:p>
                   </a:txBody>
@@ -5247,46 +5247,46 @@
                     <a:p>
                       <a:r>
                         <a:rPr sz="1600"/>
+                        <a:t>8%</a:t>
+                      </a:r>
+                    </a:p>
+                  </a:txBody>
+                  <a:tcPr/>
+                </a:tc>
+                <a:tc>
+                  <a:txBody>
+                    <a:bodyPr/>
+                    <a:lstStyle/>
+                    <a:p>
+                      <a:r>
+                        <a:rPr sz="1600"/>
+                        <a:t>20%</a:t>
+                      </a:r>
+                    </a:p>
+                  </a:txBody>
+                  <a:tcPr/>
+                </a:tc>
+                <a:tc>
+                  <a:txBody>
+                    <a:bodyPr/>
+                    <a:lstStyle/>
+                    <a:p>
+                      <a:r>
+                        <a:rPr sz="1600"/>
+                        <a:t>3%</a:t>
+                      </a:r>
+                    </a:p>
+                  </a:txBody>
+                  <a:tcPr/>
+                </a:tc>
+                <a:tc>
+                  <a:txBody>
+                    <a:bodyPr/>
+                    <a:lstStyle/>
+                    <a:p>
+                      <a:r>
+                        <a:rPr sz="1600"/>
                         <a:t>11%</a:t>
-                      </a:r>
-                    </a:p>
-                  </a:txBody>
-                  <a:tcPr/>
-                </a:tc>
-                <a:tc>
-                  <a:txBody>
-                    <a:bodyPr/>
-                    <a:lstStyle/>
-                    <a:p>
-                      <a:r>
-                        <a:rPr sz="1600"/>
-                        <a:t>5%</a:t>
-                      </a:r>
-                    </a:p>
-                  </a:txBody>
-                  <a:tcPr/>
-                </a:tc>
-                <a:tc>
-                  <a:txBody>
-                    <a:bodyPr/>
-                    <a:lstStyle/>
-                    <a:p>
-                      <a:r>
-                        <a:rPr sz="1600"/>
-                        <a:t>0%</a:t>
-                      </a:r>
-                    </a:p>
-                  </a:txBody>
-                  <a:tcPr/>
-                </a:tc>
-                <a:tc>
-                  <a:txBody>
-                    <a:bodyPr/>
-                    <a:lstStyle/>
-                    <a:p>
-                      <a:r>
-                        <a:rPr sz="1600"/>
-                        <a:t>20%</a:t>
                       </a:r>
                     </a:p>
                   </a:txBody>
@@ -5314,7 +5314,7 @@
                     <a:p>
                       <a:r>
                         <a:rPr sz="1600"/>
-                        <a:t>100%</a:t>
+                        <a:t>0%</a:t>
                       </a:r>
                     </a:p>
                   </a:txBody>
@@ -5506,6 +5506,19 @@
                     <a:p>
                       <a:r>
                         <a:rPr sz="1600"/>
+                        <a:t>Corporate</a:t>
+                      </a:r>
+                    </a:p>
+                  </a:txBody>
+                  <a:tcPr/>
+                </a:tc>
+                <a:tc>
+                  <a:txBody>
+                    <a:bodyPr/>
+                    <a:lstStyle/>
+                    <a:p>
+                      <a:r>
+                        <a:rPr sz="1600"/>
                         <a:t>Seml</a:t>
                       </a:r>
                     </a:p>
@@ -5519,46 +5532,33 @@
                     <a:p>
                       <a:r>
                         <a:rPr sz="1600"/>
-                        <a:t>Spg</a:t>
-                      </a:r>
-                    </a:p>
-                  </a:txBody>
-                  <a:tcPr/>
-                </a:tc>
-                <a:tc>
-                  <a:txBody>
-                    <a:bodyPr/>
-                    <a:lstStyle/>
-                    <a:p>
-                      <a:r>
-                        <a:rPr sz="1600"/>
-                        <a:t>Corporate</a:t>
-                      </a:r>
-                    </a:p>
-                  </a:txBody>
-                  <a:tcPr/>
-                </a:tc>
-                <a:tc>
-                  <a:txBody>
-                    <a:bodyPr/>
-                    <a:lstStyle/>
-                    <a:p>
-                      <a:r>
-                        <a:rPr sz="1600"/>
-                        <a:t>R&amp;d</a:t>
-                      </a:r>
-                    </a:p>
-                  </a:txBody>
-                  <a:tcPr/>
-                </a:tc>
-                <a:tc>
-                  <a:txBody>
-                    <a:bodyPr/>
-                    <a:lstStyle/>
-                    <a:p>
-                      <a:r>
-                        <a:rPr sz="1600"/>
-                        <a:t>Pondy formulations</a:t>
+                        <a:t>Other</a:t>
+                      </a:r>
+                    </a:p>
+                  </a:txBody>
+                  <a:tcPr/>
+                </a:tc>
+                <a:tc>
+                  <a:txBody>
+                    <a:bodyPr/>
+                    <a:lstStyle/>
+                    <a:p>
+                      <a:r>
+                        <a:rPr sz="1600"/>
+                        <a:t>Ucl</a:t>
+                      </a:r>
+                    </a:p>
+                  </a:txBody>
+                  <a:tcPr/>
+                </a:tc>
+                <a:tc>
+                  <a:txBody>
+                    <a:bodyPr/>
+                    <a:lstStyle/>
+                    <a:p>
+                      <a:r>
+                        <a:rPr sz="1600"/>
+                        <a:t>Alathur</a:t>
                       </a:r>
                     </a:p>
                   </a:txBody>
@@ -5586,6 +5586,19 @@
                     <a:p>
                       <a:r>
                         <a:rPr sz="1600"/>
+                        <a:t>13%</a:t>
+                      </a:r>
+                    </a:p>
+                  </a:txBody>
+                  <a:tcPr/>
+                </a:tc>
+                <a:tc>
+                  <a:txBody>
+                    <a:bodyPr/>
+                    <a:lstStyle/>
+                    <a:p>
+                      <a:r>
+                        <a:rPr sz="1600"/>
                         <a:t>56%</a:t>
                       </a:r>
                     </a:p>
@@ -5599,46 +5612,33 @@
                     <a:p>
                       <a:r>
                         <a:rPr sz="1600"/>
-                        <a:t>0%</a:t>
-                      </a:r>
-                    </a:p>
-                  </a:txBody>
-                  <a:tcPr/>
-                </a:tc>
-                <a:tc>
-                  <a:txBody>
-                    <a:bodyPr/>
-                    <a:lstStyle/>
-                    <a:p>
-                      <a:r>
-                        <a:rPr sz="1600"/>
-                        <a:t>13%</a:t>
-                      </a:r>
-                    </a:p>
-                  </a:txBody>
-                  <a:tcPr/>
-                </a:tc>
-                <a:tc>
-                  <a:txBody>
-                    <a:bodyPr/>
-                    <a:lstStyle/>
-                    <a:p>
-                      <a:r>
-                        <a:rPr sz="1600"/>
-                        <a:t>29%</a:t>
-                      </a:r>
-                    </a:p>
-                  </a:txBody>
-                  <a:tcPr/>
-                </a:tc>
-                <a:tc>
-                  <a:txBody>
-                    <a:bodyPr/>
-                    <a:lstStyle/>
-                    <a:p>
-                      <a:r>
-                        <a:rPr sz="1600"/>
-                        <a:t>28%</a:t>
+                        <a:t>100%</a:t>
+                      </a:r>
+                    </a:p>
+                  </a:txBody>
+                  <a:tcPr/>
+                </a:tc>
+                <a:tc>
+                  <a:txBody>
+                    <a:bodyPr/>
+                    <a:lstStyle/>
+                    <a:p>
+                      <a:r>
+                        <a:rPr sz="1600"/>
+                        <a:t>75%</a:t>
+                      </a:r>
+                    </a:p>
+                  </a:txBody>
+                  <a:tcPr/>
+                </a:tc>
+                <a:tc>
+                  <a:txBody>
+                    <a:bodyPr/>
+                    <a:lstStyle/>
+                    <a:p>
+                      <a:r>
+                        <a:rPr sz="1600"/>
+                        <a:t>48%</a:t>
                       </a:r>
                     </a:p>
                   </a:txBody>
@@ -5666,6 +5666,19 @@
                     <a:p>
                       <a:r>
                         <a:rPr sz="1600"/>
+                        <a:t>13%</a:t>
+                      </a:r>
+                    </a:p>
+                  </a:txBody>
+                  <a:tcPr/>
+                </a:tc>
+                <a:tc>
+                  <a:txBody>
+                    <a:bodyPr/>
+                    <a:lstStyle/>
+                    <a:p>
+                      <a:r>
+                        <a:rPr sz="1600"/>
                         <a:t>0%</a:t>
                       </a:r>
                     </a:p>
@@ -5692,33 +5705,20 @@
                     <a:p>
                       <a:r>
                         <a:rPr sz="1600"/>
-                        <a:t>13%</a:t>
-                      </a:r>
-                    </a:p>
-                  </a:txBody>
-                  <a:tcPr/>
-                </a:tc>
-                <a:tc>
-                  <a:txBody>
-                    <a:bodyPr/>
-                    <a:lstStyle/>
-                    <a:p>
-                      <a:r>
-                        <a:rPr sz="1600"/>
-                        <a:t>16%</a:t>
-                      </a:r>
-                    </a:p>
-                  </a:txBody>
-                  <a:tcPr/>
-                </a:tc>
-                <a:tc>
-                  <a:txBody>
-                    <a:bodyPr/>
-                    <a:lstStyle/>
-                    <a:p>
-                      <a:r>
-                        <a:rPr sz="1600"/>
-                        <a:t>21%</a:t>
+                        <a:t>0%</a:t>
+                      </a:r>
+                    </a:p>
+                  </a:txBody>
+                  <a:tcPr/>
+                </a:tc>
+                <a:tc>
+                  <a:txBody>
+                    <a:bodyPr/>
+                    <a:lstStyle/>
+                    <a:p>
+                      <a:r>
+                        <a:rPr sz="1600"/>
+                        <a:t>9%</a:t>
                       </a:r>
                     </a:p>
                   </a:txBody>
@@ -5746,6 +5746,19 @@
                     <a:p>
                       <a:r>
                         <a:rPr sz="1600"/>
+                        <a:t>73%</a:t>
+                      </a:r>
+                    </a:p>
+                  </a:txBody>
+                  <a:tcPr/>
+                </a:tc>
+                <a:tc>
+                  <a:txBody>
+                    <a:bodyPr/>
+                    <a:lstStyle/>
+                    <a:p>
+                      <a:r>
+                        <a:rPr sz="1600"/>
                         <a:t>44%</a:t>
                       </a:r>
                     </a:p>
@@ -5772,33 +5785,20 @@
                     <a:p>
                       <a:r>
                         <a:rPr sz="1600"/>
-                        <a:t>73%</a:t>
-                      </a:r>
-                    </a:p>
-                  </a:txBody>
-                  <a:tcPr/>
-                </a:tc>
-                <a:tc>
-                  <a:txBody>
-                    <a:bodyPr/>
-                    <a:lstStyle/>
-                    <a:p>
-                      <a:r>
-                        <a:rPr sz="1600"/>
-                        <a:t>55%</a:t>
-                      </a:r>
-                    </a:p>
-                  </a:txBody>
-                  <a:tcPr/>
-                </a:tc>
-                <a:tc>
-                  <a:txBody>
-                    <a:bodyPr/>
-                    <a:lstStyle/>
-                    <a:p>
-                      <a:r>
-                        <a:rPr sz="1600"/>
-                        <a:t>51%</a:t>
+                        <a:t>25%</a:t>
+                      </a:r>
+                    </a:p>
+                  </a:txBody>
+                  <a:tcPr/>
+                </a:tc>
+                <a:tc>
+                  <a:txBody>
+                    <a:bodyPr/>
+                    <a:lstStyle/>
+                    <a:p>
+                      <a:r>
+                        <a:rPr sz="1600"/>
+                        <a:t>43%</a:t>
                       </a:r>
                     </a:p>
                   </a:txBody>
@@ -5839,7 +5839,7 @@
                     <a:p>
                       <a:r>
                         <a:rPr sz="1600"/>
-                        <a:t>0%</a:t>
+                        <a:t>100%</a:t>
                       </a:r>
                     </a:p>
                   </a:txBody>
@@ -5936,7 +5936,46 @@
                     <a:p>
                       <a:r>
                         <a:rPr sz="1600"/>
-                        <a:t>Ucl</a:t>
+                        <a:t>Spg</a:t>
+                      </a:r>
+                    </a:p>
+                  </a:txBody>
+                  <a:tcPr/>
+                </a:tc>
+                <a:tc>
+                  <a:txBody>
+                    <a:bodyPr/>
+                    <a:lstStyle/>
+                    <a:p>
+                      <a:r>
+                        <a:rPr sz="1600"/>
+                        <a:t>Pondy formulations</a:t>
+                      </a:r>
+                    </a:p>
+                  </a:txBody>
+                  <a:tcPr/>
+                </a:tc>
+                <a:tc>
+                  <a:txBody>
+                    <a:bodyPr/>
+                    <a:lstStyle/>
+                    <a:p>
+                      <a:r>
+                        <a:rPr sz="1600"/>
+                        <a:t>Arcolab</a:t>
+                      </a:r>
+                    </a:p>
+                  </a:txBody>
+                  <a:tcPr/>
+                </a:tc>
+                <a:tc>
+                  <a:txBody>
+                    <a:bodyPr/>
+                    <a:lstStyle/>
+                    <a:p>
+                      <a:r>
+                        <a:rPr sz="1600"/>
+                        <a:t>R&amp;d</a:t>
                       </a:r>
                     </a:p>
                   </a:txBody>
@@ -5950,45 +5989,6 @@
                       <a:r>
                         <a:rPr sz="1600"/>
                         <a:t>Krsg</a:t>
-                      </a:r>
-                    </a:p>
-                  </a:txBody>
-                  <a:tcPr/>
-                </a:tc>
-                <a:tc>
-                  <a:txBody>
-                    <a:bodyPr/>
-                    <a:lstStyle/>
-                    <a:p>
-                      <a:r>
-                        <a:rPr sz="1600"/>
-                        <a:t>Alathur</a:t>
-                      </a:r>
-                    </a:p>
-                  </a:txBody>
-                  <a:tcPr/>
-                </a:tc>
-                <a:tc>
-                  <a:txBody>
-                    <a:bodyPr/>
-                    <a:lstStyle/>
-                    <a:p>
-                      <a:r>
-                        <a:rPr sz="1600"/>
-                        <a:t>Other</a:t>
-                      </a:r>
-                    </a:p>
-                  </a:txBody>
-                  <a:tcPr/>
-                </a:tc>
-                <a:tc>
-                  <a:txBody>
-                    <a:bodyPr/>
-                    <a:lstStyle/>
-                    <a:p>
-                      <a:r>
-                        <a:rPr sz="1600"/>
-                        <a:t>Arcolab</a:t>
                       </a:r>
                     </a:p>
                   </a:txBody>
@@ -6016,7 +6016,46 @@
                     <a:p>
                       <a:r>
                         <a:rPr sz="1600"/>
-                        <a:t>75%</a:t>
+                        <a:t>0%</a:t>
+                      </a:r>
+                    </a:p>
+                  </a:txBody>
+                  <a:tcPr/>
+                </a:tc>
+                <a:tc>
+                  <a:txBody>
+                    <a:bodyPr/>
+                    <a:lstStyle/>
+                    <a:p>
+                      <a:r>
+                        <a:rPr sz="1600"/>
+                        <a:t>28%</a:t>
+                      </a:r>
+                    </a:p>
+                  </a:txBody>
+                  <a:tcPr/>
+                </a:tc>
+                <a:tc>
+                  <a:txBody>
+                    <a:bodyPr/>
+                    <a:lstStyle/>
+                    <a:p>
+                      <a:r>
+                        <a:rPr sz="1600"/>
+                        <a:t>17%</a:t>
+                      </a:r>
+                    </a:p>
+                  </a:txBody>
+                  <a:tcPr/>
+                </a:tc>
+                <a:tc>
+                  <a:txBody>
+                    <a:bodyPr/>
+                    <a:lstStyle/>
+                    <a:p>
+                      <a:r>
+                        <a:rPr sz="1600"/>
+                        <a:t>29%</a:t>
                       </a:r>
                     </a:p>
                   </a:txBody>
@@ -6030,45 +6069,6 @@
                       <a:r>
                         <a:rPr sz="1600"/>
                         <a:t>41%</a:t>
-                      </a:r>
-                    </a:p>
-                  </a:txBody>
-                  <a:tcPr/>
-                </a:tc>
-                <a:tc>
-                  <a:txBody>
-                    <a:bodyPr/>
-                    <a:lstStyle/>
-                    <a:p>
-                      <a:r>
-                        <a:rPr sz="1600"/>
-                        <a:t>48%</a:t>
-                      </a:r>
-                    </a:p>
-                  </a:txBody>
-                  <a:tcPr/>
-                </a:tc>
-                <a:tc>
-                  <a:txBody>
-                    <a:bodyPr/>
-                    <a:lstStyle/>
-                    <a:p>
-                      <a:r>
-                        <a:rPr sz="1600"/>
-                        <a:t>100%</a:t>
-                      </a:r>
-                    </a:p>
-                  </a:txBody>
-                  <a:tcPr/>
-                </a:tc>
-                <a:tc>
-                  <a:txBody>
-                    <a:bodyPr/>
-                    <a:lstStyle/>
-                    <a:p>
-                      <a:r>
-                        <a:rPr sz="1600"/>
-                        <a:t>17%</a:t>
                       </a:r>
                     </a:p>
                   </a:txBody>
@@ -6109,46 +6109,46 @@
                     <a:p>
                       <a:r>
                         <a:rPr sz="1600"/>
+                        <a:t>21%</a:t>
+                      </a:r>
+                    </a:p>
+                  </a:txBody>
+                  <a:tcPr/>
+                </a:tc>
+                <a:tc>
+                  <a:txBody>
+                    <a:bodyPr/>
+                    <a:lstStyle/>
+                    <a:p>
+                      <a:r>
+                        <a:rPr sz="1600"/>
+                        <a:t>0%</a:t>
+                      </a:r>
+                    </a:p>
+                  </a:txBody>
+                  <a:tcPr/>
+                </a:tc>
+                <a:tc>
+                  <a:txBody>
+                    <a:bodyPr/>
+                    <a:lstStyle/>
+                    <a:p>
+                      <a:r>
+                        <a:rPr sz="1600"/>
+                        <a:t>16%</a:t>
+                      </a:r>
+                    </a:p>
+                  </a:txBody>
+                  <a:tcPr/>
+                </a:tc>
+                <a:tc>
+                  <a:txBody>
+                    <a:bodyPr/>
+                    <a:lstStyle/>
+                    <a:p>
+                      <a:r>
+                        <a:rPr sz="1600"/>
                         <a:t>27%</a:t>
-                      </a:r>
-                    </a:p>
-                  </a:txBody>
-                  <a:tcPr/>
-                </a:tc>
-                <a:tc>
-                  <a:txBody>
-                    <a:bodyPr/>
-                    <a:lstStyle/>
-                    <a:p>
-                      <a:r>
-                        <a:rPr sz="1600"/>
-                        <a:t>9%</a:t>
-                      </a:r>
-                    </a:p>
-                  </a:txBody>
-                  <a:tcPr/>
-                </a:tc>
-                <a:tc>
-                  <a:txBody>
-                    <a:bodyPr/>
-                    <a:lstStyle/>
-                    <a:p>
-                      <a:r>
-                        <a:rPr sz="1600"/>
-                        <a:t>0%</a:t>
-                      </a:r>
-                    </a:p>
-                  </a:txBody>
-                  <a:tcPr/>
-                </a:tc>
-                <a:tc>
-                  <a:txBody>
-                    <a:bodyPr/>
-                    <a:lstStyle/>
-                    <a:p>
-                      <a:r>
-                        <a:rPr sz="1600"/>
-                        <a:t>0%</a:t>
                       </a:r>
                     </a:p>
                   </a:txBody>
@@ -6176,7 +6176,46 @@
                     <a:p>
                       <a:r>
                         <a:rPr sz="1600"/>
-                        <a:t>25%</a:t>
+                        <a:t>0%</a:t>
+                      </a:r>
+                    </a:p>
+                  </a:txBody>
+                  <a:tcPr/>
+                </a:tc>
+                <a:tc>
+                  <a:txBody>
+                    <a:bodyPr/>
+                    <a:lstStyle/>
+                    <a:p>
+                      <a:r>
+                        <a:rPr sz="1600"/>
+                        <a:t>51%</a:t>
+                      </a:r>
+                    </a:p>
+                  </a:txBody>
+                  <a:tcPr/>
+                </a:tc>
+                <a:tc>
+                  <a:txBody>
+                    <a:bodyPr/>
+                    <a:lstStyle/>
+                    <a:p>
+                      <a:r>
+                        <a:rPr sz="1600"/>
+                        <a:t>83%</a:t>
+                      </a:r>
+                    </a:p>
+                  </a:txBody>
+                  <a:tcPr/>
+                </a:tc>
+                <a:tc>
+                  <a:txBody>
+                    <a:bodyPr/>
+                    <a:lstStyle/>
+                    <a:p>
+                      <a:r>
+                        <a:rPr sz="1600"/>
+                        <a:t>55%</a:t>
                       </a:r>
                     </a:p>
                   </a:txBody>
@@ -6190,45 +6229,6 @@
                       <a:r>
                         <a:rPr sz="1600"/>
                         <a:t>32%</a:t>
-                      </a:r>
-                    </a:p>
-                  </a:txBody>
-                  <a:tcPr/>
-                </a:tc>
-                <a:tc>
-                  <a:txBody>
-                    <a:bodyPr/>
-                    <a:lstStyle/>
-                    <a:p>
-                      <a:r>
-                        <a:rPr sz="1600"/>
-                        <a:t>43%</a:t>
-                      </a:r>
-                    </a:p>
-                  </a:txBody>
-                  <a:tcPr/>
-                </a:tc>
-                <a:tc>
-                  <a:txBody>
-                    <a:bodyPr/>
-                    <a:lstStyle/>
-                    <a:p>
-                      <a:r>
-                        <a:rPr sz="1600"/>
-                        <a:t>0%</a:t>
-                      </a:r>
-                    </a:p>
-                  </a:txBody>
-                  <a:tcPr/>
-                </a:tc>
-                <a:tc>
-                  <a:txBody>
-                    <a:bodyPr/>
-                    <a:lstStyle/>
-                    <a:p>
-                      <a:r>
-                        <a:rPr sz="1600"/>
-                        <a:t>83%</a:t>
                       </a:r>
                     </a:p>
                   </a:txBody>
@@ -6256,7 +6256,7 @@
                     <a:p>
                       <a:r>
                         <a:rPr sz="1600"/>
-                        <a:t>100%</a:t>
+                        <a:t>0%</a:t>
                       </a:r>
                     </a:p>
                   </a:txBody>
@@ -6448,6 +6448,19 @@
                     <a:p>
                       <a:r>
                         <a:rPr sz="1600"/>
+                        <a:t>Corporate</a:t>
+                      </a:r>
+                    </a:p>
+                  </a:txBody>
+                  <a:tcPr/>
+                </a:tc>
+                <a:tc>
+                  <a:txBody>
+                    <a:bodyPr/>
+                    <a:lstStyle/>
+                    <a:p>
+                      <a:r>
+                        <a:rPr sz="1600"/>
                         <a:t>Seml</a:t>
                       </a:r>
                     </a:p>
@@ -6461,46 +6474,33 @@
                     <a:p>
                       <a:r>
                         <a:rPr sz="1600"/>
-                        <a:t>Spg</a:t>
-                      </a:r>
-                    </a:p>
-                  </a:txBody>
-                  <a:tcPr/>
-                </a:tc>
-                <a:tc>
-                  <a:txBody>
-                    <a:bodyPr/>
-                    <a:lstStyle/>
-                    <a:p>
-                      <a:r>
-                        <a:rPr sz="1600"/>
-                        <a:t>Corporate</a:t>
-                      </a:r>
-                    </a:p>
-                  </a:txBody>
-                  <a:tcPr/>
-                </a:tc>
-                <a:tc>
-                  <a:txBody>
-                    <a:bodyPr/>
-                    <a:lstStyle/>
-                    <a:p>
-                      <a:r>
-                        <a:rPr sz="1600"/>
-                        <a:t>R&amp;d</a:t>
-                      </a:r>
-                    </a:p>
-                  </a:txBody>
-                  <a:tcPr/>
-                </a:tc>
-                <a:tc>
-                  <a:txBody>
-                    <a:bodyPr/>
-                    <a:lstStyle/>
-                    <a:p>
-                      <a:r>
-                        <a:rPr sz="1600"/>
-                        <a:t>Pondy formulations</a:t>
+                        <a:t>Other</a:t>
+                      </a:r>
+                    </a:p>
+                  </a:txBody>
+                  <a:tcPr/>
+                </a:tc>
+                <a:tc>
+                  <a:txBody>
+                    <a:bodyPr/>
+                    <a:lstStyle/>
+                    <a:p>
+                      <a:r>
+                        <a:rPr sz="1600"/>
+                        <a:t>Ucl</a:t>
+                      </a:r>
+                    </a:p>
+                  </a:txBody>
+                  <a:tcPr/>
+                </a:tc>
+                <a:tc>
+                  <a:txBody>
+                    <a:bodyPr/>
+                    <a:lstStyle/>
+                    <a:p>
+                      <a:r>
+                        <a:rPr sz="1600"/>
+                        <a:t>Alathur</a:t>
                       </a:r>
                     </a:p>
                   </a:txBody>
@@ -6528,6 +6528,19 @@
                     <a:p>
                       <a:r>
                         <a:rPr sz="1600"/>
+                        <a:t>100%</a:t>
+                      </a:r>
+                    </a:p>
+                  </a:txBody>
+                  <a:tcPr/>
+                </a:tc>
+                <a:tc>
+                  <a:txBody>
+                    <a:bodyPr/>
+                    <a:lstStyle/>
+                    <a:p>
+                      <a:r>
+                        <a:rPr sz="1600"/>
                         <a:t>0%</a:t>
                       </a:r>
                     </a:p>
@@ -6554,19 +6567,6 @@
                     <a:p>
                       <a:r>
                         <a:rPr sz="1600"/>
-                        <a:t>100%</a:t>
-                      </a:r>
-                    </a:p>
-                  </a:txBody>
-                  <a:tcPr/>
-                </a:tc>
-                <a:tc>
-                  <a:txBody>
-                    <a:bodyPr/>
-                    <a:lstStyle/>
-                    <a:p>
-                      <a:r>
-                        <a:rPr sz="1600"/>
                         <a:t>0%</a:t>
                       </a:r>
                     </a:p>
@@ -6580,7 +6580,7 @@
                     <a:p>
                       <a:r>
                         <a:rPr sz="1600"/>
-                        <a:t>21%</a:t>
+                        <a:t>50%</a:t>
                       </a:r>
                     </a:p>
                   </a:txBody>
@@ -6660,7 +6660,7 @@
                     <a:p>
                       <a:r>
                         <a:rPr sz="1600"/>
-                        <a:t>5%</a:t>
+                        <a:t>50%</a:t>
                       </a:r>
                     </a:p>
                   </a:txBody>
@@ -6740,7 +6740,7 @@
                     <a:p>
                       <a:r>
                         <a:rPr sz="1600"/>
-                        <a:t>74%</a:t>
+                        <a:t>0%</a:t>
                       </a:r>
                     </a:p>
                   </a:txBody>
@@ -6768,6 +6768,19 @@
                     <a:p>
                       <a:r>
                         <a:rPr sz="1600"/>
+                        <a:t>100%</a:t>
+                      </a:r>
+                    </a:p>
+                  </a:txBody>
+                  <a:tcPr/>
+                </a:tc>
+                <a:tc>
+                  <a:txBody>
+                    <a:bodyPr/>
+                    <a:lstStyle/>
+                    <a:p>
+                      <a:r>
+                        <a:rPr sz="1600"/>
                         <a:t>0%</a:t>
                       </a:r>
                     </a:p>
@@ -6782,19 +6795,6 @@
                       <a:r>
                         <a:rPr sz="1600"/>
                         <a:t>0%</a:t>
-                      </a:r>
-                    </a:p>
-                  </a:txBody>
-                  <a:tcPr/>
-                </a:tc>
-                <a:tc>
-                  <a:txBody>
-                    <a:bodyPr/>
-                    <a:lstStyle/>
-                    <a:p>
-                      <a:r>
-                        <a:rPr sz="1600"/>
-                        <a:t>100%</a:t>
                       </a:r>
                     </a:p>
                   </a:txBody>
@@ -6878,7 +6878,46 @@
                     <a:p>
                       <a:r>
                         <a:rPr sz="1600"/>
-                        <a:t>Ucl</a:t>
+                        <a:t>Spg</a:t>
+                      </a:r>
+                    </a:p>
+                  </a:txBody>
+                  <a:tcPr/>
+                </a:tc>
+                <a:tc>
+                  <a:txBody>
+                    <a:bodyPr/>
+                    <a:lstStyle/>
+                    <a:p>
+                      <a:r>
+                        <a:rPr sz="1600"/>
+                        <a:t>Pondy formulations</a:t>
+                      </a:r>
+                    </a:p>
+                  </a:txBody>
+                  <a:tcPr/>
+                </a:tc>
+                <a:tc>
+                  <a:txBody>
+                    <a:bodyPr/>
+                    <a:lstStyle/>
+                    <a:p>
+                      <a:r>
+                        <a:rPr sz="1600"/>
+                        <a:t>Arcolab</a:t>
+                      </a:r>
+                    </a:p>
+                  </a:txBody>
+                  <a:tcPr/>
+                </a:tc>
+                <a:tc>
+                  <a:txBody>
+                    <a:bodyPr/>
+                    <a:lstStyle/>
+                    <a:p>
+                      <a:r>
+                        <a:rPr sz="1600"/>
+                        <a:t>R&amp;d</a:t>
                       </a:r>
                     </a:p>
                   </a:txBody>
@@ -6892,45 +6931,6 @@
                       <a:r>
                         <a:rPr sz="1600"/>
                         <a:t>Krsg</a:t>
-                      </a:r>
-                    </a:p>
-                  </a:txBody>
-                  <a:tcPr/>
-                </a:tc>
-                <a:tc>
-                  <a:txBody>
-                    <a:bodyPr/>
-                    <a:lstStyle/>
-                    <a:p>
-                      <a:r>
-                        <a:rPr sz="1600"/>
-                        <a:t>Alathur</a:t>
-                      </a:r>
-                    </a:p>
-                  </a:txBody>
-                  <a:tcPr/>
-                </a:tc>
-                <a:tc>
-                  <a:txBody>
-                    <a:bodyPr/>
-                    <a:lstStyle/>
-                    <a:p>
-                      <a:r>
-                        <a:rPr sz="1600"/>
-                        <a:t>Other</a:t>
-                      </a:r>
-                    </a:p>
-                  </a:txBody>
-                  <a:tcPr/>
-                </a:tc>
-                <a:tc>
-                  <a:txBody>
-                    <a:bodyPr/>
-                    <a:lstStyle/>
-                    <a:p>
-                      <a:r>
-                        <a:rPr sz="1600"/>
-                        <a:t>Arcolab</a:t>
                       </a:r>
                     </a:p>
                   </a:txBody>
@@ -6971,46 +6971,46 @@
                     <a:p>
                       <a:r>
                         <a:rPr sz="1600"/>
+                        <a:t>21%</a:t>
+                      </a:r>
+                    </a:p>
+                  </a:txBody>
+                  <a:tcPr/>
+                </a:tc>
+                <a:tc>
+                  <a:txBody>
+                    <a:bodyPr/>
+                    <a:lstStyle/>
+                    <a:p>
+                      <a:r>
+                        <a:rPr sz="1600"/>
+                        <a:t>0%</a:t>
+                      </a:r>
+                    </a:p>
+                  </a:txBody>
+                  <a:tcPr/>
+                </a:tc>
+                <a:tc>
+                  <a:txBody>
+                    <a:bodyPr/>
+                    <a:lstStyle/>
+                    <a:p>
+                      <a:r>
+                        <a:rPr sz="1600"/>
+                        <a:t>0%</a:t>
+                      </a:r>
+                    </a:p>
+                  </a:txBody>
+                  <a:tcPr/>
+                </a:tc>
+                <a:tc>
+                  <a:txBody>
+                    <a:bodyPr/>
+                    <a:lstStyle/>
+                    <a:p>
+                      <a:r>
+                        <a:rPr sz="1600"/>
                         <a:t>36%</a:t>
-                      </a:r>
-                    </a:p>
-                  </a:txBody>
-                  <a:tcPr/>
-                </a:tc>
-                <a:tc>
-                  <a:txBody>
-                    <a:bodyPr/>
-                    <a:lstStyle/>
-                    <a:p>
-                      <a:r>
-                        <a:rPr sz="1600"/>
-                        <a:t>50%</a:t>
-                      </a:r>
-                    </a:p>
-                  </a:txBody>
-                  <a:tcPr/>
-                </a:tc>
-                <a:tc>
-                  <a:txBody>
-                    <a:bodyPr/>
-                    <a:lstStyle/>
-                    <a:p>
-                      <a:r>
-                        <a:rPr sz="1600"/>
-                        <a:t>0%</a:t>
-                      </a:r>
-                    </a:p>
-                  </a:txBody>
-                  <a:tcPr/>
-                </a:tc>
-                <a:tc>
-                  <a:txBody>
-                    <a:bodyPr/>
-                    <a:lstStyle/>
-                    <a:p>
-                      <a:r>
-                        <a:rPr sz="1600"/>
-                        <a:t>0%</a:t>
                       </a:r>
                     </a:p>
                   </a:txBody>
@@ -7051,46 +7051,46 @@
                     <a:p>
                       <a:r>
                         <a:rPr sz="1600"/>
+                        <a:t>5%</a:t>
+                      </a:r>
+                    </a:p>
+                  </a:txBody>
+                  <a:tcPr/>
+                </a:tc>
+                <a:tc>
+                  <a:txBody>
+                    <a:bodyPr/>
+                    <a:lstStyle/>
+                    <a:p>
+                      <a:r>
+                        <a:rPr sz="1600"/>
+                        <a:t>0%</a:t>
+                      </a:r>
+                    </a:p>
+                  </a:txBody>
+                  <a:tcPr/>
+                </a:tc>
+                <a:tc>
+                  <a:txBody>
+                    <a:bodyPr/>
+                    <a:lstStyle/>
+                    <a:p>
+                      <a:r>
+                        <a:rPr sz="1600"/>
+                        <a:t>0%</a:t>
+                      </a:r>
+                    </a:p>
+                  </a:txBody>
+                  <a:tcPr/>
+                </a:tc>
+                <a:tc>
+                  <a:txBody>
+                    <a:bodyPr/>
+                    <a:lstStyle/>
+                    <a:p>
+                      <a:r>
+                        <a:rPr sz="1600"/>
                         <a:t>6%</a:t>
-                      </a:r>
-                    </a:p>
-                  </a:txBody>
-                  <a:tcPr/>
-                </a:tc>
-                <a:tc>
-                  <a:txBody>
-                    <a:bodyPr/>
-                    <a:lstStyle/>
-                    <a:p>
-                      <a:r>
-                        <a:rPr sz="1600"/>
-                        <a:t>50%</a:t>
-                      </a:r>
-                    </a:p>
-                  </a:txBody>
-                  <a:tcPr/>
-                </a:tc>
-                <a:tc>
-                  <a:txBody>
-                    <a:bodyPr/>
-                    <a:lstStyle/>
-                    <a:p>
-                      <a:r>
-                        <a:rPr sz="1600"/>
-                        <a:t>0%</a:t>
-                      </a:r>
-                    </a:p>
-                  </a:txBody>
-                  <a:tcPr/>
-                </a:tc>
-                <a:tc>
-                  <a:txBody>
-                    <a:bodyPr/>
-                    <a:lstStyle/>
-                    <a:p>
-                      <a:r>
-                        <a:rPr sz="1600"/>
-                        <a:t>0%</a:t>
                       </a:r>
                     </a:p>
                   </a:txBody>
@@ -7118,6 +7118,32 @@
                     <a:p>
                       <a:r>
                         <a:rPr sz="1600"/>
+                        <a:t>0%</a:t>
+                      </a:r>
+                    </a:p>
+                  </a:txBody>
+                  <a:tcPr/>
+                </a:tc>
+                <a:tc>
+                  <a:txBody>
+                    <a:bodyPr/>
+                    <a:lstStyle/>
+                    <a:p>
+                      <a:r>
+                        <a:rPr sz="1600"/>
+                        <a:t>74%</a:t>
+                      </a:r>
+                    </a:p>
+                  </a:txBody>
+                  <a:tcPr/>
+                </a:tc>
+                <a:tc>
+                  <a:txBody>
+                    <a:bodyPr/>
+                    <a:lstStyle/>
+                    <a:p>
+                      <a:r>
+                        <a:rPr sz="1600"/>
                         <a:t>100%</a:t>
                       </a:r>
                     </a:p>
@@ -7131,46 +7157,20 @@
                     <a:p>
                       <a:r>
                         <a:rPr sz="1600"/>
+                        <a:t>100%</a:t>
+                      </a:r>
+                    </a:p>
+                  </a:txBody>
+                  <a:tcPr/>
+                </a:tc>
+                <a:tc>
+                  <a:txBody>
+                    <a:bodyPr/>
+                    <a:lstStyle/>
+                    <a:p>
+                      <a:r>
+                        <a:rPr sz="1600"/>
                         <a:t>58%</a:t>
-                      </a:r>
-                    </a:p>
-                  </a:txBody>
-                  <a:tcPr/>
-                </a:tc>
-                <a:tc>
-                  <a:txBody>
-                    <a:bodyPr/>
-                    <a:lstStyle/>
-                    <a:p>
-                      <a:r>
-                        <a:rPr sz="1600"/>
-                        <a:t>0%</a:t>
-                      </a:r>
-                    </a:p>
-                  </a:txBody>
-                  <a:tcPr/>
-                </a:tc>
-                <a:tc>
-                  <a:txBody>
-                    <a:bodyPr/>
-                    <a:lstStyle/>
-                    <a:p>
-                      <a:r>
-                        <a:rPr sz="1600"/>
-                        <a:t>0%</a:t>
-                      </a:r>
-                    </a:p>
-                  </a:txBody>
-                  <a:tcPr/>
-                </a:tc>
-                <a:tc>
-                  <a:txBody>
-                    <a:bodyPr/>
-                    <a:lstStyle/>
-                    <a:p>
-                      <a:r>
-                        <a:rPr sz="1600"/>
-                        <a:t>100%</a:t>
                       </a:r>
                     </a:p>
                   </a:txBody>
@@ -7198,6 +7198,19 @@
                     <a:p>
                       <a:r>
                         <a:rPr sz="1600"/>
+                        <a:t>0%</a:t>
+                      </a:r>
+                    </a:p>
+                  </a:txBody>
+                  <a:tcPr/>
+                </a:tc>
+                <a:tc>
+                  <a:txBody>
+                    <a:bodyPr/>
+                    <a:lstStyle/>
+                    <a:p>
+                      <a:r>
+                        <a:rPr sz="1600"/>
                         <a:t>100%</a:t>
                       </a:r>
                     </a:p>
@@ -7225,19 +7238,6 @@
                       <a:r>
                         <a:rPr sz="1600"/>
                         <a:t>100%</a:t>
-                      </a:r>
-                    </a:p>
-                  </a:txBody>
-                  <a:tcPr/>
-                </a:tc>
-                <a:tc>
-                  <a:txBody>
-                    <a:bodyPr/>
-                    <a:lstStyle/>
-                    <a:p>
-                      <a:r>
-                        <a:rPr sz="1600"/>
-                        <a:t>0%</a:t>
                       </a:r>
                     </a:p>
                   </a:txBody>

</xml_diff>

<commit_message>
Optimize value data and add comments
</commit_message>
<xml_diff>
--- a/FlaskApp/static/generated/51Test1.pptx
+++ b/FlaskApp/static/generated/51Test1.pptx
@@ -4010,7 +4010,7 @@
                     <a:lstStyle/>
                     <a:p>
                       <a:r>
-                        <a:t>114</a:t>
+                        <a:t>99</a:t>
                       </a:r>
                     </a:p>
                   </a:txBody>
@@ -4110,7 +4110,7 @@
                     <a:lstStyle/>
                     <a:p>
                       <a:r>
-                        <a:t>117</a:t>
+                        <a:t>102</a:t>
                       </a:r>
                     </a:p>
                   </a:txBody>
@@ -4244,59 +4244,59 @@
                     <a:p>
                       <a:r>
                         <a:rPr sz="1600"/>
+                        <a:t>Arcolab</a:t>
+                      </a:r>
+                    </a:p>
+                  </a:txBody>
+                  <a:tcPr/>
+                </a:tc>
+                <a:tc>
+                  <a:txBody>
+                    <a:bodyPr/>
+                    <a:lstStyle/>
+                    <a:p>
+                      <a:r>
+                        <a:rPr sz="1600"/>
+                        <a:t>Ucl</a:t>
+                      </a:r>
+                    </a:p>
+                  </a:txBody>
+                  <a:tcPr/>
+                </a:tc>
+                <a:tc>
+                  <a:txBody>
+                    <a:bodyPr/>
+                    <a:lstStyle/>
+                    <a:p>
+                      <a:r>
+                        <a:rPr sz="1600"/>
+                        <a:t>Spg</a:t>
+                      </a:r>
+                    </a:p>
+                  </a:txBody>
+                  <a:tcPr/>
+                </a:tc>
+                <a:tc>
+                  <a:txBody>
+                    <a:bodyPr/>
+                    <a:lstStyle/>
+                    <a:p>
+                      <a:r>
+                        <a:rPr sz="1600"/>
+                        <a:t>Krsg</a:t>
+                      </a:r>
+                    </a:p>
+                  </a:txBody>
+                  <a:tcPr/>
+                </a:tc>
+                <a:tc>
+                  <a:txBody>
+                    <a:bodyPr/>
+                    <a:lstStyle/>
+                    <a:p>
+                      <a:r>
+                        <a:rPr sz="1600"/>
                         <a:t>Corporate</a:t>
-                      </a:r>
-                    </a:p>
-                  </a:txBody>
-                  <a:tcPr/>
-                </a:tc>
-                <a:tc>
-                  <a:txBody>
-                    <a:bodyPr/>
-                    <a:lstStyle/>
-                    <a:p>
-                      <a:r>
-                        <a:rPr sz="1600"/>
-                        <a:t>Seml</a:t>
-                      </a:r>
-                    </a:p>
-                  </a:txBody>
-                  <a:tcPr/>
-                </a:tc>
-                <a:tc>
-                  <a:txBody>
-                    <a:bodyPr/>
-                    <a:lstStyle/>
-                    <a:p>
-                      <a:r>
-                        <a:rPr sz="1600"/>
-                        <a:t>Other</a:t>
-                      </a:r>
-                    </a:p>
-                  </a:txBody>
-                  <a:tcPr/>
-                </a:tc>
-                <a:tc>
-                  <a:txBody>
-                    <a:bodyPr/>
-                    <a:lstStyle/>
-                    <a:p>
-                      <a:r>
-                        <a:rPr sz="1600"/>
-                        <a:t>Ucl</a:t>
-                      </a:r>
-                    </a:p>
-                  </a:txBody>
-                  <a:tcPr/>
-                </a:tc>
-                <a:tc>
-                  <a:txBody>
-                    <a:bodyPr/>
-                    <a:lstStyle/>
-                    <a:p>
-                      <a:r>
-                        <a:rPr sz="1600"/>
-                        <a:t>Alathur</a:t>
                       </a:r>
                     </a:p>
                   </a:txBody>
@@ -4324,59 +4324,59 @@
                     <a:p>
                       <a:r>
                         <a:rPr sz="1600"/>
+                        <a:t>40%</a:t>
+                      </a:r>
+                    </a:p>
+                  </a:txBody>
+                  <a:tcPr/>
+                </a:tc>
+                <a:tc>
+                  <a:txBody>
+                    <a:bodyPr/>
+                    <a:lstStyle/>
+                    <a:p>
+                      <a:r>
+                        <a:rPr sz="1600"/>
+                        <a:t>50%</a:t>
+                      </a:r>
+                    </a:p>
+                  </a:txBody>
+                  <a:tcPr/>
+                </a:tc>
+                <a:tc>
+                  <a:txBody>
+                    <a:bodyPr/>
+                    <a:lstStyle/>
+                    <a:p>
+                      <a:r>
+                        <a:rPr sz="1600"/>
+                        <a:t>0%</a:t>
+                      </a:r>
+                    </a:p>
+                  </a:txBody>
+                  <a:tcPr/>
+                </a:tc>
+                <a:tc>
+                  <a:txBody>
+                    <a:bodyPr/>
+                    <a:lstStyle/>
+                    <a:p>
+                      <a:r>
+                        <a:rPr sz="1600"/>
+                        <a:t>29%</a:t>
+                      </a:r>
+                    </a:p>
+                  </a:txBody>
+                  <a:tcPr/>
+                </a:tc>
+                <a:tc>
+                  <a:txBody>
+                    <a:bodyPr/>
+                    <a:lstStyle/>
+                    <a:p>
+                      <a:r>
+                        <a:rPr sz="1600"/>
                         <a:t>13%</a:t>
-                      </a:r>
-                    </a:p>
-                  </a:txBody>
-                  <a:tcPr/>
-                </a:tc>
-                <a:tc>
-                  <a:txBody>
-                    <a:bodyPr/>
-                    <a:lstStyle/>
-                    <a:p>
-                      <a:r>
-                        <a:rPr sz="1600"/>
-                        <a:t>44%</a:t>
-                      </a:r>
-                    </a:p>
-                  </a:txBody>
-                  <a:tcPr/>
-                </a:tc>
-                <a:tc>
-                  <a:txBody>
-                    <a:bodyPr/>
-                    <a:lstStyle/>
-                    <a:p>
-                      <a:r>
-                        <a:rPr sz="1600"/>
-                        <a:t>0%</a:t>
-                      </a:r>
-                    </a:p>
-                  </a:txBody>
-                  <a:tcPr/>
-                </a:tc>
-                <a:tc>
-                  <a:txBody>
-                    <a:bodyPr/>
-                    <a:lstStyle/>
-                    <a:p>
-                      <a:r>
-                        <a:rPr sz="1600"/>
-                        <a:t>50%</a:t>
-                      </a:r>
-                    </a:p>
-                  </a:txBody>
-                  <a:tcPr/>
-                </a:tc>
-                <a:tc>
-                  <a:txBody>
-                    <a:bodyPr/>
-                    <a:lstStyle/>
-                    <a:p>
-                      <a:r>
-                        <a:rPr sz="1600"/>
-                        <a:t>27%</a:t>
                       </a:r>
                     </a:p>
                   </a:txBody>
@@ -4417,19 +4417,6 @@
                     <a:p>
                       <a:r>
                         <a:rPr sz="1600"/>
-                        <a:t>6%</a:t>
-                      </a:r>
-                    </a:p>
-                  </a:txBody>
-                  <a:tcPr/>
-                </a:tc>
-                <a:tc>
-                  <a:txBody>
-                    <a:bodyPr/>
-                    <a:lstStyle/>
-                    <a:p>
-                      <a:r>
-                        <a:rPr sz="1600"/>
                         <a:t>0%</a:t>
                       </a:r>
                     </a:p>
@@ -4456,7 +4443,20 @@
                     <a:p>
                       <a:r>
                         <a:rPr sz="1600"/>
-                        <a:t>18%</a:t>
+                        <a:t>21%</a:t>
+                      </a:r>
+                    </a:p>
+                  </a:txBody>
+                  <a:tcPr/>
+                </a:tc>
+                <a:tc>
+                  <a:txBody>
+                    <a:bodyPr/>
+                    <a:lstStyle/>
+                    <a:p>
+                      <a:r>
+                        <a:rPr sz="1600"/>
+                        <a:t>20%</a:t>
                       </a:r>
                     </a:p>
                   </a:txBody>
@@ -4484,59 +4484,59 @@
                     <a:p>
                       <a:r>
                         <a:rPr sz="1600"/>
+                        <a:t>0%</a:t>
+                      </a:r>
+                    </a:p>
+                  </a:txBody>
+                  <a:tcPr/>
+                </a:tc>
+                <a:tc>
+                  <a:txBody>
+                    <a:bodyPr/>
+                    <a:lstStyle/>
+                    <a:p>
+                      <a:r>
+                        <a:rPr sz="1600"/>
+                        <a:t>0%</a:t>
+                      </a:r>
+                    </a:p>
+                  </a:txBody>
+                  <a:tcPr/>
+                </a:tc>
+                <a:tc>
+                  <a:txBody>
+                    <a:bodyPr/>
+                    <a:lstStyle/>
+                    <a:p>
+                      <a:r>
+                        <a:rPr sz="1600"/>
+                        <a:t>0%</a:t>
+                      </a:r>
+                    </a:p>
+                  </a:txBody>
+                  <a:tcPr/>
+                </a:tc>
+                <a:tc>
+                  <a:txBody>
+                    <a:bodyPr/>
+                    <a:lstStyle/>
+                    <a:p>
+                      <a:r>
+                        <a:rPr sz="1600"/>
+                        <a:t>24%</a:t>
+                      </a:r>
+                    </a:p>
+                  </a:txBody>
+                  <a:tcPr/>
+                </a:tc>
+                <a:tc>
+                  <a:txBody>
+                    <a:bodyPr/>
+                    <a:lstStyle/>
+                    <a:p>
+                      <a:r>
+                        <a:rPr sz="1600"/>
                         <a:t>40%</a:t>
-                      </a:r>
-                    </a:p>
-                  </a:txBody>
-                  <a:tcPr/>
-                </a:tc>
-                <a:tc>
-                  <a:txBody>
-                    <a:bodyPr/>
-                    <a:lstStyle/>
-                    <a:p>
-                      <a:r>
-                        <a:rPr sz="1600"/>
-                        <a:t>11%</a:t>
-                      </a:r>
-                    </a:p>
-                  </a:txBody>
-                  <a:tcPr/>
-                </a:tc>
-                <a:tc>
-                  <a:txBody>
-                    <a:bodyPr/>
-                    <a:lstStyle/>
-                    <a:p>
-                      <a:r>
-                        <a:rPr sz="1600"/>
-                        <a:t>100%</a:t>
-                      </a:r>
-                    </a:p>
-                  </a:txBody>
-                  <a:tcPr/>
-                </a:tc>
-                <a:tc>
-                  <a:txBody>
-                    <a:bodyPr/>
-                    <a:lstStyle/>
-                    <a:p>
-                      <a:r>
-                        <a:rPr sz="1600"/>
-                        <a:t>0%</a:t>
-                      </a:r>
-                    </a:p>
-                  </a:txBody>
-                  <a:tcPr/>
-                </a:tc>
-                <a:tc>
-                  <a:txBody>
-                    <a:bodyPr/>
-                    <a:lstStyle/>
-                    <a:p>
-                      <a:r>
-                        <a:rPr sz="1600"/>
-                        <a:t>36%</a:t>
                       </a:r>
                     </a:p>
                   </a:txBody>
@@ -4564,59 +4564,59 @@
                     <a:p>
                       <a:r>
                         <a:rPr sz="1600"/>
+                        <a:t>20%</a:t>
+                      </a:r>
+                    </a:p>
+                  </a:txBody>
+                  <a:tcPr/>
+                </a:tc>
+                <a:tc>
+                  <a:txBody>
+                    <a:bodyPr/>
+                    <a:lstStyle/>
+                    <a:p>
+                      <a:r>
+                        <a:rPr sz="1600"/>
+                        <a:t>50%</a:t>
+                      </a:r>
+                    </a:p>
+                  </a:txBody>
+                  <a:tcPr/>
+                </a:tc>
+                <a:tc>
+                  <a:txBody>
+                    <a:bodyPr/>
+                    <a:lstStyle/>
+                    <a:p>
+                      <a:r>
+                        <a:rPr sz="1600"/>
+                        <a:t>0%</a:t>
+                      </a:r>
+                    </a:p>
+                  </a:txBody>
+                  <a:tcPr/>
+                </a:tc>
+                <a:tc>
+                  <a:txBody>
+                    <a:bodyPr/>
+                    <a:lstStyle/>
+                    <a:p>
+                      <a:r>
+                        <a:rPr sz="1600"/>
+                        <a:t>14%</a:t>
+                      </a:r>
+                    </a:p>
+                  </a:txBody>
+                  <a:tcPr/>
+                </a:tc>
+                <a:tc>
+                  <a:txBody>
+                    <a:bodyPr/>
+                    <a:lstStyle/>
+                    <a:p>
+                      <a:r>
+                        <a:rPr sz="1600"/>
                         <a:t>7%</a:t>
-                      </a:r>
-                    </a:p>
-                  </a:txBody>
-                  <a:tcPr/>
-                </a:tc>
-                <a:tc>
-                  <a:txBody>
-                    <a:bodyPr/>
-                    <a:lstStyle/>
-                    <a:p>
-                      <a:r>
-                        <a:rPr sz="1600"/>
-                        <a:t>17%</a:t>
-                      </a:r>
-                    </a:p>
-                  </a:txBody>
-                  <a:tcPr/>
-                </a:tc>
-                <a:tc>
-                  <a:txBody>
-                    <a:bodyPr/>
-                    <a:lstStyle/>
-                    <a:p>
-                      <a:r>
-                        <a:rPr sz="1600"/>
-                        <a:t>0%</a:t>
-                      </a:r>
-                    </a:p>
-                  </a:txBody>
-                  <a:tcPr/>
-                </a:tc>
-                <a:tc>
-                  <a:txBody>
-                    <a:bodyPr/>
-                    <a:lstStyle/>
-                    <a:p>
-                      <a:r>
-                        <a:rPr sz="1600"/>
-                        <a:t>50%</a:t>
-                      </a:r>
-                    </a:p>
-                  </a:txBody>
-                  <a:tcPr/>
-                </a:tc>
-                <a:tc>
-                  <a:txBody>
-                    <a:bodyPr/>
-                    <a:lstStyle/>
-                    <a:p>
-                      <a:r>
-                        <a:rPr sz="1600"/>
-                        <a:t>14%</a:t>
                       </a:r>
                     </a:p>
                   </a:txBody>
@@ -4657,19 +4657,6 @@
                     <a:p>
                       <a:r>
                         <a:rPr sz="1600"/>
-                        <a:t>22%</a:t>
-                      </a:r>
-                    </a:p>
-                  </a:txBody>
-                  <a:tcPr/>
-                </a:tc>
-                <a:tc>
-                  <a:txBody>
-                    <a:bodyPr/>
-                    <a:lstStyle/>
-                    <a:p>
-                      <a:r>
-                        <a:rPr sz="1600"/>
                         <a:t>0%</a:t>
                       </a:r>
                     </a:p>
@@ -4696,7 +4683,20 @@
                     <a:p>
                       <a:r>
                         <a:rPr sz="1600"/>
-                        <a:t>5%</a:t>
+                        <a:t>11%</a:t>
+                      </a:r>
+                    </a:p>
+                  </a:txBody>
+                  <a:tcPr/>
+                </a:tc>
+                <a:tc>
+                  <a:txBody>
+                    <a:bodyPr/>
+                    <a:lstStyle/>
+                    <a:p>
+                      <a:r>
+                        <a:rPr sz="1600"/>
+                        <a:t>20%</a:t>
                       </a:r>
                     </a:p>
                   </a:txBody>
@@ -4750,7 +4750,7 @@
                     <a:p>
                       <a:r>
                         <a:rPr sz="1600"/>
-                        <a:t>100%</a:t>
+                        <a:t>0%</a:t>
                       </a:r>
                     </a:p>
                   </a:txBody>
@@ -4834,7 +4834,46 @@
                     <a:p>
                       <a:r>
                         <a:rPr sz="1600"/>
-                        <a:t>Spg</a:t>
+                        <a:t>Seml</a:t>
+                      </a:r>
+                    </a:p>
+                  </a:txBody>
+                  <a:tcPr/>
+                </a:tc>
+                <a:tc>
+                  <a:txBody>
+                    <a:bodyPr/>
+                    <a:lstStyle/>
+                    <a:p>
+                      <a:r>
+                        <a:rPr sz="1600"/>
+                        <a:t>Other</a:t>
+                      </a:r>
+                    </a:p>
+                  </a:txBody>
+                  <a:tcPr/>
+                </a:tc>
+                <a:tc>
+                  <a:txBody>
+                    <a:bodyPr/>
+                    <a:lstStyle/>
+                    <a:p>
+                      <a:r>
+                        <a:rPr sz="1600"/>
+                        <a:t>R&amp;d</a:t>
+                      </a:r>
+                    </a:p>
+                  </a:txBody>
+                  <a:tcPr/>
+                </a:tc>
+                <a:tc>
+                  <a:txBody>
+                    <a:bodyPr/>
+                    <a:lstStyle/>
+                    <a:p>
+                      <a:r>
+                        <a:rPr sz="1600"/>
+                        <a:t>Alathur</a:t>
                       </a:r>
                     </a:p>
                   </a:txBody>
@@ -4848,45 +4887,6 @@
                       <a:r>
                         <a:rPr sz="1600"/>
                         <a:t>Pondy formulations</a:t>
-                      </a:r>
-                    </a:p>
-                  </a:txBody>
-                  <a:tcPr/>
-                </a:tc>
-                <a:tc>
-                  <a:txBody>
-                    <a:bodyPr/>
-                    <a:lstStyle/>
-                    <a:p>
-                      <a:r>
-                        <a:rPr sz="1600"/>
-                        <a:t>Arcolab</a:t>
-                      </a:r>
-                    </a:p>
-                  </a:txBody>
-                  <a:tcPr/>
-                </a:tc>
-                <a:tc>
-                  <a:txBody>
-                    <a:bodyPr/>
-                    <a:lstStyle/>
-                    <a:p>
-                      <a:r>
-                        <a:rPr sz="1600"/>
-                        <a:t>R&amp;d</a:t>
-                      </a:r>
-                    </a:p>
-                  </a:txBody>
-                  <a:tcPr/>
-                </a:tc>
-                <a:tc>
-                  <a:txBody>
-                    <a:bodyPr/>
-                    <a:lstStyle/>
-                    <a:p>
-                      <a:r>
-                        <a:rPr sz="1600"/>
-                        <a:t>Krsg</a:t>
                       </a:r>
                     </a:p>
                   </a:txBody>
@@ -4914,6 +4914,19 @@
                     <a:p>
                       <a:r>
                         <a:rPr sz="1600"/>
+                        <a:t>44%</a:t>
+                      </a:r>
+                    </a:p>
+                  </a:txBody>
+                  <a:tcPr/>
+                </a:tc>
+                <a:tc>
+                  <a:txBody>
+                    <a:bodyPr/>
+                    <a:lstStyle/>
+                    <a:p>
+                      <a:r>
+                        <a:rPr sz="1600"/>
                         <a:t>0%</a:t>
                       </a:r>
                     </a:p>
@@ -4927,46 +4940,33 @@
                     <a:p>
                       <a:r>
                         <a:rPr sz="1600"/>
+                        <a:t>31%</a:t>
+                      </a:r>
+                    </a:p>
+                  </a:txBody>
+                  <a:tcPr/>
+                </a:tc>
+                <a:tc>
+                  <a:txBody>
+                    <a:bodyPr/>
+                    <a:lstStyle/>
+                    <a:p>
+                      <a:r>
+                        <a:rPr sz="1600"/>
+                        <a:t>27%</a:t>
+                      </a:r>
+                    </a:p>
+                  </a:txBody>
+                  <a:tcPr/>
+                </a:tc>
+                <a:tc>
+                  <a:txBody>
+                    <a:bodyPr/>
+                    <a:lstStyle/>
+                    <a:p>
+                      <a:r>
+                        <a:rPr sz="1600"/>
                         <a:t>33%</a:t>
-                      </a:r>
-                    </a:p>
-                  </a:txBody>
-                  <a:tcPr/>
-                </a:tc>
-                <a:tc>
-                  <a:txBody>
-                    <a:bodyPr/>
-                    <a:lstStyle/>
-                    <a:p>
-                      <a:r>
-                        <a:rPr sz="1600"/>
-                        <a:t>40%</a:t>
-                      </a:r>
-                    </a:p>
-                  </a:txBody>
-                  <a:tcPr/>
-                </a:tc>
-                <a:tc>
-                  <a:txBody>
-                    <a:bodyPr/>
-                    <a:lstStyle/>
-                    <a:p>
-                      <a:r>
-                        <a:rPr sz="1600"/>
-                        <a:t>31%</a:t>
-                      </a:r>
-                    </a:p>
-                  </a:txBody>
-                  <a:tcPr/>
-                </a:tc>
-                <a:tc>
-                  <a:txBody>
-                    <a:bodyPr/>
-                    <a:lstStyle/>
-                    <a:p>
-                      <a:r>
-                        <a:rPr sz="1600"/>
-                        <a:t>29%</a:t>
                       </a:r>
                     </a:p>
                   </a:txBody>
@@ -4994,6 +4994,19 @@
                     <a:p>
                       <a:r>
                         <a:rPr sz="1600"/>
+                        <a:t>6%</a:t>
+                      </a:r>
+                    </a:p>
+                  </a:txBody>
+                  <a:tcPr/>
+                </a:tc>
+                <a:tc>
+                  <a:txBody>
+                    <a:bodyPr/>
+                    <a:lstStyle/>
+                    <a:p>
+                      <a:r>
+                        <a:rPr sz="1600"/>
                         <a:t>0%</a:t>
                       </a:r>
                     </a:p>
@@ -5007,46 +5020,33 @@
                     <a:p>
                       <a:r>
                         <a:rPr sz="1600"/>
+                        <a:t>28%</a:t>
+                      </a:r>
+                    </a:p>
+                  </a:txBody>
+                  <a:tcPr/>
+                </a:tc>
+                <a:tc>
+                  <a:txBody>
+                    <a:bodyPr/>
+                    <a:lstStyle/>
+                    <a:p>
+                      <a:r>
+                        <a:rPr sz="1600"/>
+                        <a:t>18%</a:t>
+                      </a:r>
+                    </a:p>
+                  </a:txBody>
+                  <a:tcPr/>
+                </a:tc>
+                <a:tc>
+                  <a:txBody>
+                    <a:bodyPr/>
+                    <a:lstStyle/>
+                    <a:p>
+                      <a:r>
+                        <a:rPr sz="1600"/>
                         <a:t>20%</a:t>
-                      </a:r>
-                    </a:p>
-                  </a:txBody>
-                  <a:tcPr/>
-                </a:tc>
-                <a:tc>
-                  <a:txBody>
-                    <a:bodyPr/>
-                    <a:lstStyle/>
-                    <a:p>
-                      <a:r>
-                        <a:rPr sz="1600"/>
-                        <a:t>20%</a:t>
-                      </a:r>
-                    </a:p>
-                  </a:txBody>
-                  <a:tcPr/>
-                </a:tc>
-                <a:tc>
-                  <a:txBody>
-                    <a:bodyPr/>
-                    <a:lstStyle/>
-                    <a:p>
-                      <a:r>
-                        <a:rPr sz="1600"/>
-                        <a:t>28%</a:t>
-                      </a:r>
-                    </a:p>
-                  </a:txBody>
-                  <a:tcPr/>
-                </a:tc>
-                <a:tc>
-                  <a:txBody>
-                    <a:bodyPr/>
-                    <a:lstStyle/>
-                    <a:p>
-                      <a:r>
-                        <a:rPr sz="1600"/>
-                        <a:t>21%</a:t>
                       </a:r>
                     </a:p>
                   </a:txBody>
@@ -5074,33 +5074,20 @@
                     <a:p>
                       <a:r>
                         <a:rPr sz="1600"/>
-                        <a:t>0%</a:t>
-                      </a:r>
-                    </a:p>
-                  </a:txBody>
-                  <a:tcPr/>
-                </a:tc>
-                <a:tc>
-                  <a:txBody>
-                    <a:bodyPr/>
-                    <a:lstStyle/>
-                    <a:p>
-                      <a:r>
-                        <a:rPr sz="1600"/>
-                        <a:t>24%</a:t>
-                      </a:r>
-                    </a:p>
-                  </a:txBody>
-                  <a:tcPr/>
-                </a:tc>
-                <a:tc>
-                  <a:txBody>
-                    <a:bodyPr/>
-                    <a:lstStyle/>
-                    <a:p>
-                      <a:r>
-                        <a:rPr sz="1600"/>
-                        <a:t>0%</a:t>
+                        <a:t>11%</a:t>
+                      </a:r>
+                    </a:p>
+                  </a:txBody>
+                  <a:tcPr/>
+                </a:tc>
+                <a:tc>
+                  <a:txBody>
+                    <a:bodyPr/>
+                    <a:lstStyle/>
+                    <a:p>
+                      <a:r>
+                        <a:rPr sz="1600"/>
+                        <a:t>100%</a:t>
                       </a:r>
                     </a:p>
                   </a:txBody>
@@ -5114,6 +5101,19 @@
                       <a:r>
                         <a:rPr sz="1600"/>
                         <a:t>31%</a:t>
+                      </a:r>
+                    </a:p>
+                  </a:txBody>
+                  <a:tcPr/>
+                </a:tc>
+                <a:tc>
+                  <a:txBody>
+                    <a:bodyPr/>
+                    <a:lstStyle/>
+                    <a:p>
+                      <a:r>
+                        <a:rPr sz="1600"/>
+                        <a:t>36%</a:t>
                       </a:r>
                     </a:p>
                   </a:txBody>
@@ -5154,6 +5154,19 @@
                     <a:p>
                       <a:r>
                         <a:rPr sz="1600"/>
+                        <a:t>17%</a:t>
+                      </a:r>
+                    </a:p>
+                  </a:txBody>
+                  <a:tcPr/>
+                </a:tc>
+                <a:tc>
+                  <a:txBody>
+                    <a:bodyPr/>
+                    <a:lstStyle/>
+                    <a:p>
+                      <a:r>
+                        <a:rPr sz="1600"/>
                         <a:t>0%</a:t>
                       </a:r>
                     </a:p>
@@ -5167,33 +5180,20 @@
                     <a:p>
                       <a:r>
                         <a:rPr sz="1600"/>
+                        <a:t>6%</a:t>
+                      </a:r>
+                    </a:p>
+                  </a:txBody>
+                  <a:tcPr/>
+                </a:tc>
+                <a:tc>
+                  <a:txBody>
+                    <a:bodyPr/>
+                    <a:lstStyle/>
+                    <a:p>
+                      <a:r>
+                        <a:rPr sz="1600"/>
                         <a:t>14%</a:t>
-                      </a:r>
-                    </a:p>
-                  </a:txBody>
-                  <a:tcPr/>
-                </a:tc>
-                <a:tc>
-                  <a:txBody>
-                    <a:bodyPr/>
-                    <a:lstStyle/>
-                    <a:p>
-                      <a:r>
-                        <a:rPr sz="1600"/>
-                        <a:t>20%</a:t>
-                      </a:r>
-                    </a:p>
-                  </a:txBody>
-                  <a:tcPr/>
-                </a:tc>
-                <a:tc>
-                  <a:txBody>
-                    <a:bodyPr/>
-                    <a:lstStyle/>
-                    <a:p>
-                      <a:r>
-                        <a:rPr sz="1600"/>
-                        <a:t>6%</a:t>
                       </a:r>
                     </a:p>
                   </a:txBody>
@@ -5234,6 +5234,19 @@
                     <a:p>
                       <a:r>
                         <a:rPr sz="1600"/>
+                        <a:t>22%</a:t>
+                      </a:r>
+                    </a:p>
+                  </a:txBody>
+                  <a:tcPr/>
+                </a:tc>
+                <a:tc>
+                  <a:txBody>
+                    <a:bodyPr/>
+                    <a:lstStyle/>
+                    <a:p>
+                      <a:r>
+                        <a:rPr sz="1600"/>
                         <a:t>0%</a:t>
                       </a:r>
                     </a:p>
@@ -5247,46 +5260,33 @@
                     <a:p>
                       <a:r>
                         <a:rPr sz="1600"/>
+                        <a:t>3%</a:t>
+                      </a:r>
+                    </a:p>
+                  </a:txBody>
+                  <a:tcPr/>
+                </a:tc>
+                <a:tc>
+                  <a:txBody>
+                    <a:bodyPr/>
+                    <a:lstStyle/>
+                    <a:p>
+                      <a:r>
+                        <a:rPr sz="1600"/>
+                        <a:t>5%</a:t>
+                      </a:r>
+                    </a:p>
+                  </a:txBody>
+                  <a:tcPr/>
+                </a:tc>
+                <a:tc>
+                  <a:txBody>
+                    <a:bodyPr/>
+                    <a:lstStyle/>
+                    <a:p>
+                      <a:r>
+                        <a:rPr sz="1600"/>
                         <a:t>8%</a:t>
-                      </a:r>
-                    </a:p>
-                  </a:txBody>
-                  <a:tcPr/>
-                </a:tc>
-                <a:tc>
-                  <a:txBody>
-                    <a:bodyPr/>
-                    <a:lstStyle/>
-                    <a:p>
-                      <a:r>
-                        <a:rPr sz="1600"/>
-                        <a:t>20%</a:t>
-                      </a:r>
-                    </a:p>
-                  </a:txBody>
-                  <a:tcPr/>
-                </a:tc>
-                <a:tc>
-                  <a:txBody>
-                    <a:bodyPr/>
-                    <a:lstStyle/>
-                    <a:p>
-                      <a:r>
-                        <a:rPr sz="1600"/>
-                        <a:t>3%</a:t>
-                      </a:r>
-                    </a:p>
-                  </a:txBody>
-                  <a:tcPr/>
-                </a:tc>
-                <a:tc>
-                  <a:txBody>
-                    <a:bodyPr/>
-                    <a:lstStyle/>
-                    <a:p>
-                      <a:r>
-                        <a:rPr sz="1600"/>
-                        <a:t>11%</a:t>
                       </a:r>
                     </a:p>
                   </a:txBody>
@@ -5314,7 +5314,7 @@
                     <a:p>
                       <a:r>
                         <a:rPr sz="1600"/>
-                        <a:t>0%</a:t>
+                        <a:t>100%</a:t>
                       </a:r>
                     </a:p>
                   </a:txBody>
@@ -5506,59 +5506,59 @@
                     <a:p>
                       <a:r>
                         <a:rPr sz="1600"/>
+                        <a:t>Arcolab</a:t>
+                      </a:r>
+                    </a:p>
+                  </a:txBody>
+                  <a:tcPr/>
+                </a:tc>
+                <a:tc>
+                  <a:txBody>
+                    <a:bodyPr/>
+                    <a:lstStyle/>
+                    <a:p>
+                      <a:r>
+                        <a:rPr sz="1600"/>
+                        <a:t>Ucl</a:t>
+                      </a:r>
+                    </a:p>
+                  </a:txBody>
+                  <a:tcPr/>
+                </a:tc>
+                <a:tc>
+                  <a:txBody>
+                    <a:bodyPr/>
+                    <a:lstStyle/>
+                    <a:p>
+                      <a:r>
+                        <a:rPr sz="1600"/>
+                        <a:t>Spg</a:t>
+                      </a:r>
+                    </a:p>
+                  </a:txBody>
+                  <a:tcPr/>
+                </a:tc>
+                <a:tc>
+                  <a:txBody>
+                    <a:bodyPr/>
+                    <a:lstStyle/>
+                    <a:p>
+                      <a:r>
+                        <a:rPr sz="1600"/>
+                        <a:t>Krsg</a:t>
+                      </a:r>
+                    </a:p>
+                  </a:txBody>
+                  <a:tcPr/>
+                </a:tc>
+                <a:tc>
+                  <a:txBody>
+                    <a:bodyPr/>
+                    <a:lstStyle/>
+                    <a:p>
+                      <a:r>
+                        <a:rPr sz="1600"/>
                         <a:t>Corporate</a:t>
-                      </a:r>
-                    </a:p>
-                  </a:txBody>
-                  <a:tcPr/>
-                </a:tc>
-                <a:tc>
-                  <a:txBody>
-                    <a:bodyPr/>
-                    <a:lstStyle/>
-                    <a:p>
-                      <a:r>
-                        <a:rPr sz="1600"/>
-                        <a:t>Seml</a:t>
-                      </a:r>
-                    </a:p>
-                  </a:txBody>
-                  <a:tcPr/>
-                </a:tc>
-                <a:tc>
-                  <a:txBody>
-                    <a:bodyPr/>
-                    <a:lstStyle/>
-                    <a:p>
-                      <a:r>
-                        <a:rPr sz="1600"/>
-                        <a:t>Other</a:t>
-                      </a:r>
-                    </a:p>
-                  </a:txBody>
-                  <a:tcPr/>
-                </a:tc>
-                <a:tc>
-                  <a:txBody>
-                    <a:bodyPr/>
-                    <a:lstStyle/>
-                    <a:p>
-                      <a:r>
-                        <a:rPr sz="1600"/>
-                        <a:t>Ucl</a:t>
-                      </a:r>
-                    </a:p>
-                  </a:txBody>
-                  <a:tcPr/>
-                </a:tc>
-                <a:tc>
-                  <a:txBody>
-                    <a:bodyPr/>
-                    <a:lstStyle/>
-                    <a:p>
-                      <a:r>
-                        <a:rPr sz="1600"/>
-                        <a:t>Alathur</a:t>
                       </a:r>
                     </a:p>
                   </a:txBody>
@@ -5586,59 +5586,59 @@
                     <a:p>
                       <a:r>
                         <a:rPr sz="1600"/>
+                        <a:t>17%</a:t>
+                      </a:r>
+                    </a:p>
+                  </a:txBody>
+                  <a:tcPr/>
+                </a:tc>
+                <a:tc>
+                  <a:txBody>
+                    <a:bodyPr/>
+                    <a:lstStyle/>
+                    <a:p>
+                      <a:r>
+                        <a:rPr sz="1600"/>
+                        <a:t>75%</a:t>
+                      </a:r>
+                    </a:p>
+                  </a:txBody>
+                  <a:tcPr/>
+                </a:tc>
+                <a:tc>
+                  <a:txBody>
+                    <a:bodyPr/>
+                    <a:lstStyle/>
+                    <a:p>
+                      <a:r>
+                        <a:rPr sz="1600"/>
+                        <a:t>0%</a:t>
+                      </a:r>
+                    </a:p>
+                  </a:txBody>
+                  <a:tcPr/>
+                </a:tc>
+                <a:tc>
+                  <a:txBody>
+                    <a:bodyPr/>
+                    <a:lstStyle/>
+                    <a:p>
+                      <a:r>
+                        <a:rPr sz="1600"/>
+                        <a:t>41%</a:t>
+                      </a:r>
+                    </a:p>
+                  </a:txBody>
+                  <a:tcPr/>
+                </a:tc>
+                <a:tc>
+                  <a:txBody>
+                    <a:bodyPr/>
+                    <a:lstStyle/>
+                    <a:p>
+                      <a:r>
+                        <a:rPr sz="1600"/>
                         <a:t>13%</a:t>
-                      </a:r>
-                    </a:p>
-                  </a:txBody>
-                  <a:tcPr/>
-                </a:tc>
-                <a:tc>
-                  <a:txBody>
-                    <a:bodyPr/>
-                    <a:lstStyle/>
-                    <a:p>
-                      <a:r>
-                        <a:rPr sz="1600"/>
-                        <a:t>56%</a:t>
-                      </a:r>
-                    </a:p>
-                  </a:txBody>
-                  <a:tcPr/>
-                </a:tc>
-                <a:tc>
-                  <a:txBody>
-                    <a:bodyPr/>
-                    <a:lstStyle/>
-                    <a:p>
-                      <a:r>
-                        <a:rPr sz="1600"/>
-                        <a:t>100%</a:t>
-                      </a:r>
-                    </a:p>
-                  </a:txBody>
-                  <a:tcPr/>
-                </a:tc>
-                <a:tc>
-                  <a:txBody>
-                    <a:bodyPr/>
-                    <a:lstStyle/>
-                    <a:p>
-                      <a:r>
-                        <a:rPr sz="1600"/>
-                        <a:t>75%</a:t>
-                      </a:r>
-                    </a:p>
-                  </a:txBody>
-                  <a:tcPr/>
-                </a:tc>
-                <a:tc>
-                  <a:txBody>
-                    <a:bodyPr/>
-                    <a:lstStyle/>
-                    <a:p>
-                      <a:r>
-                        <a:rPr sz="1600"/>
-                        <a:t>48%</a:t>
                       </a:r>
                     </a:p>
                   </a:txBody>
@@ -5666,59 +5666,59 @@
                     <a:p>
                       <a:r>
                         <a:rPr sz="1600"/>
+                        <a:t>0%</a:t>
+                      </a:r>
+                    </a:p>
+                  </a:txBody>
+                  <a:tcPr/>
+                </a:tc>
+                <a:tc>
+                  <a:txBody>
+                    <a:bodyPr/>
+                    <a:lstStyle/>
+                    <a:p>
+                      <a:r>
+                        <a:rPr sz="1600"/>
+                        <a:t>0%</a:t>
+                      </a:r>
+                    </a:p>
+                  </a:txBody>
+                  <a:tcPr/>
+                </a:tc>
+                <a:tc>
+                  <a:txBody>
+                    <a:bodyPr/>
+                    <a:lstStyle/>
+                    <a:p>
+                      <a:r>
+                        <a:rPr sz="1600"/>
+                        <a:t>0%</a:t>
+                      </a:r>
+                    </a:p>
+                  </a:txBody>
+                  <a:tcPr/>
+                </a:tc>
+                <a:tc>
+                  <a:txBody>
+                    <a:bodyPr/>
+                    <a:lstStyle/>
+                    <a:p>
+                      <a:r>
+                        <a:rPr sz="1600"/>
+                        <a:t>27%</a:t>
+                      </a:r>
+                    </a:p>
+                  </a:txBody>
+                  <a:tcPr/>
+                </a:tc>
+                <a:tc>
+                  <a:txBody>
+                    <a:bodyPr/>
+                    <a:lstStyle/>
+                    <a:p>
+                      <a:r>
+                        <a:rPr sz="1600"/>
                         <a:t>13%</a:t>
-                      </a:r>
-                    </a:p>
-                  </a:txBody>
-                  <a:tcPr/>
-                </a:tc>
-                <a:tc>
-                  <a:txBody>
-                    <a:bodyPr/>
-                    <a:lstStyle/>
-                    <a:p>
-                      <a:r>
-                        <a:rPr sz="1600"/>
-                        <a:t>0%</a:t>
-                      </a:r>
-                    </a:p>
-                  </a:txBody>
-                  <a:tcPr/>
-                </a:tc>
-                <a:tc>
-                  <a:txBody>
-                    <a:bodyPr/>
-                    <a:lstStyle/>
-                    <a:p>
-                      <a:r>
-                        <a:rPr sz="1600"/>
-                        <a:t>0%</a:t>
-                      </a:r>
-                    </a:p>
-                  </a:txBody>
-                  <a:tcPr/>
-                </a:tc>
-                <a:tc>
-                  <a:txBody>
-                    <a:bodyPr/>
-                    <a:lstStyle/>
-                    <a:p>
-                      <a:r>
-                        <a:rPr sz="1600"/>
-                        <a:t>0%</a:t>
-                      </a:r>
-                    </a:p>
-                  </a:txBody>
-                  <a:tcPr/>
-                </a:tc>
-                <a:tc>
-                  <a:txBody>
-                    <a:bodyPr/>
-                    <a:lstStyle/>
-                    <a:p>
-                      <a:r>
-                        <a:rPr sz="1600"/>
-                        <a:t>9%</a:t>
                       </a:r>
                     </a:p>
                   </a:txBody>
@@ -5746,59 +5746,59 @@
                     <a:p>
                       <a:r>
                         <a:rPr sz="1600"/>
+                        <a:t>83%</a:t>
+                      </a:r>
+                    </a:p>
+                  </a:txBody>
+                  <a:tcPr/>
+                </a:tc>
+                <a:tc>
+                  <a:txBody>
+                    <a:bodyPr/>
+                    <a:lstStyle/>
+                    <a:p>
+                      <a:r>
+                        <a:rPr sz="1600"/>
+                        <a:t>25%</a:t>
+                      </a:r>
+                    </a:p>
+                  </a:txBody>
+                  <a:tcPr/>
+                </a:tc>
+                <a:tc>
+                  <a:txBody>
+                    <a:bodyPr/>
+                    <a:lstStyle/>
+                    <a:p>
+                      <a:r>
+                        <a:rPr sz="1600"/>
+                        <a:t>0%</a:t>
+                      </a:r>
+                    </a:p>
+                  </a:txBody>
+                  <a:tcPr/>
+                </a:tc>
+                <a:tc>
+                  <a:txBody>
+                    <a:bodyPr/>
+                    <a:lstStyle/>
+                    <a:p>
+                      <a:r>
+                        <a:rPr sz="1600"/>
+                        <a:t>32%</a:t>
+                      </a:r>
+                    </a:p>
+                  </a:txBody>
+                  <a:tcPr/>
+                </a:tc>
+                <a:tc>
+                  <a:txBody>
+                    <a:bodyPr/>
+                    <a:lstStyle/>
+                    <a:p>
+                      <a:r>
+                        <a:rPr sz="1600"/>
                         <a:t>73%</a:t>
-                      </a:r>
-                    </a:p>
-                  </a:txBody>
-                  <a:tcPr/>
-                </a:tc>
-                <a:tc>
-                  <a:txBody>
-                    <a:bodyPr/>
-                    <a:lstStyle/>
-                    <a:p>
-                      <a:r>
-                        <a:rPr sz="1600"/>
-                        <a:t>44%</a:t>
-                      </a:r>
-                    </a:p>
-                  </a:txBody>
-                  <a:tcPr/>
-                </a:tc>
-                <a:tc>
-                  <a:txBody>
-                    <a:bodyPr/>
-                    <a:lstStyle/>
-                    <a:p>
-                      <a:r>
-                        <a:rPr sz="1600"/>
-                        <a:t>0%</a:t>
-                      </a:r>
-                    </a:p>
-                  </a:txBody>
-                  <a:tcPr/>
-                </a:tc>
-                <a:tc>
-                  <a:txBody>
-                    <a:bodyPr/>
-                    <a:lstStyle/>
-                    <a:p>
-                      <a:r>
-                        <a:rPr sz="1600"/>
-                        <a:t>25%</a:t>
-                      </a:r>
-                    </a:p>
-                  </a:txBody>
-                  <a:tcPr/>
-                </a:tc>
-                <a:tc>
-                  <a:txBody>
-                    <a:bodyPr/>
-                    <a:lstStyle/>
-                    <a:p>
-                      <a:r>
-                        <a:rPr sz="1600"/>
-                        <a:t>43%</a:t>
                       </a:r>
                     </a:p>
                   </a:txBody>
@@ -5852,7 +5852,7 @@
                     <a:p>
                       <a:r>
                         <a:rPr sz="1600"/>
-                        <a:t>100%</a:t>
+                        <a:t>0%</a:t>
                       </a:r>
                     </a:p>
                   </a:txBody>
@@ -5936,7 +5936,46 @@
                     <a:p>
                       <a:r>
                         <a:rPr sz="1600"/>
-                        <a:t>Spg</a:t>
+                        <a:t>Seml</a:t>
+                      </a:r>
+                    </a:p>
+                  </a:txBody>
+                  <a:tcPr/>
+                </a:tc>
+                <a:tc>
+                  <a:txBody>
+                    <a:bodyPr/>
+                    <a:lstStyle/>
+                    <a:p>
+                      <a:r>
+                        <a:rPr sz="1600"/>
+                        <a:t>Other</a:t>
+                      </a:r>
+                    </a:p>
+                  </a:txBody>
+                  <a:tcPr/>
+                </a:tc>
+                <a:tc>
+                  <a:txBody>
+                    <a:bodyPr/>
+                    <a:lstStyle/>
+                    <a:p>
+                      <a:r>
+                        <a:rPr sz="1600"/>
+                        <a:t>R&amp;d</a:t>
+                      </a:r>
+                    </a:p>
+                  </a:txBody>
+                  <a:tcPr/>
+                </a:tc>
+                <a:tc>
+                  <a:txBody>
+                    <a:bodyPr/>
+                    <a:lstStyle/>
+                    <a:p>
+                      <a:r>
+                        <a:rPr sz="1600"/>
+                        <a:t>Alathur</a:t>
                       </a:r>
                     </a:p>
                   </a:txBody>
@@ -5950,45 +5989,6 @@
                       <a:r>
                         <a:rPr sz="1600"/>
                         <a:t>Pondy formulations</a:t>
-                      </a:r>
-                    </a:p>
-                  </a:txBody>
-                  <a:tcPr/>
-                </a:tc>
-                <a:tc>
-                  <a:txBody>
-                    <a:bodyPr/>
-                    <a:lstStyle/>
-                    <a:p>
-                      <a:r>
-                        <a:rPr sz="1600"/>
-                        <a:t>Arcolab</a:t>
-                      </a:r>
-                    </a:p>
-                  </a:txBody>
-                  <a:tcPr/>
-                </a:tc>
-                <a:tc>
-                  <a:txBody>
-                    <a:bodyPr/>
-                    <a:lstStyle/>
-                    <a:p>
-                      <a:r>
-                        <a:rPr sz="1600"/>
-                        <a:t>R&amp;d</a:t>
-                      </a:r>
-                    </a:p>
-                  </a:txBody>
-                  <a:tcPr/>
-                </a:tc>
-                <a:tc>
-                  <a:txBody>
-                    <a:bodyPr/>
-                    <a:lstStyle/>
-                    <a:p>
-                      <a:r>
-                        <a:rPr sz="1600"/>
-                        <a:t>Krsg</a:t>
                       </a:r>
                     </a:p>
                   </a:txBody>
@@ -6016,7 +6016,46 @@
                     <a:p>
                       <a:r>
                         <a:rPr sz="1600"/>
-                        <a:t>0%</a:t>
+                        <a:t>56%</a:t>
+                      </a:r>
+                    </a:p>
+                  </a:txBody>
+                  <a:tcPr/>
+                </a:tc>
+                <a:tc>
+                  <a:txBody>
+                    <a:bodyPr/>
+                    <a:lstStyle/>
+                    <a:p>
+                      <a:r>
+                        <a:rPr sz="1600"/>
+                        <a:t>100%</a:t>
+                      </a:r>
+                    </a:p>
+                  </a:txBody>
+                  <a:tcPr/>
+                </a:tc>
+                <a:tc>
+                  <a:txBody>
+                    <a:bodyPr/>
+                    <a:lstStyle/>
+                    <a:p>
+                      <a:r>
+                        <a:rPr sz="1600"/>
+                        <a:t>29%</a:t>
+                      </a:r>
+                    </a:p>
+                  </a:txBody>
+                  <a:tcPr/>
+                </a:tc>
+                <a:tc>
+                  <a:txBody>
+                    <a:bodyPr/>
+                    <a:lstStyle/>
+                    <a:p>
+                      <a:r>
+                        <a:rPr sz="1600"/>
+                        <a:t>48%</a:t>
                       </a:r>
                     </a:p>
                   </a:txBody>
@@ -6030,45 +6069,6 @@
                       <a:r>
                         <a:rPr sz="1600"/>
                         <a:t>28%</a:t>
-                      </a:r>
-                    </a:p>
-                  </a:txBody>
-                  <a:tcPr/>
-                </a:tc>
-                <a:tc>
-                  <a:txBody>
-                    <a:bodyPr/>
-                    <a:lstStyle/>
-                    <a:p>
-                      <a:r>
-                        <a:rPr sz="1600"/>
-                        <a:t>17%</a:t>
-                      </a:r>
-                    </a:p>
-                  </a:txBody>
-                  <a:tcPr/>
-                </a:tc>
-                <a:tc>
-                  <a:txBody>
-                    <a:bodyPr/>
-                    <a:lstStyle/>
-                    <a:p>
-                      <a:r>
-                        <a:rPr sz="1600"/>
-                        <a:t>29%</a:t>
-                      </a:r>
-                    </a:p>
-                  </a:txBody>
-                  <a:tcPr/>
-                </a:tc>
-                <a:tc>
-                  <a:txBody>
-                    <a:bodyPr/>
-                    <a:lstStyle/>
-                    <a:p>
-                      <a:r>
-                        <a:rPr sz="1600"/>
-                        <a:t>41%</a:t>
                       </a:r>
                     </a:p>
                   </a:txBody>
@@ -6109,46 +6109,46 @@
                     <a:p>
                       <a:r>
                         <a:rPr sz="1600"/>
+                        <a:t>0%</a:t>
+                      </a:r>
+                    </a:p>
+                  </a:txBody>
+                  <a:tcPr/>
+                </a:tc>
+                <a:tc>
+                  <a:txBody>
+                    <a:bodyPr/>
+                    <a:lstStyle/>
+                    <a:p>
+                      <a:r>
+                        <a:rPr sz="1600"/>
+                        <a:t>16%</a:t>
+                      </a:r>
+                    </a:p>
+                  </a:txBody>
+                  <a:tcPr/>
+                </a:tc>
+                <a:tc>
+                  <a:txBody>
+                    <a:bodyPr/>
+                    <a:lstStyle/>
+                    <a:p>
+                      <a:r>
+                        <a:rPr sz="1600"/>
+                        <a:t>9%</a:t>
+                      </a:r>
+                    </a:p>
+                  </a:txBody>
+                  <a:tcPr/>
+                </a:tc>
+                <a:tc>
+                  <a:txBody>
+                    <a:bodyPr/>
+                    <a:lstStyle/>
+                    <a:p>
+                      <a:r>
+                        <a:rPr sz="1600"/>
                         <a:t>21%</a:t>
-                      </a:r>
-                    </a:p>
-                  </a:txBody>
-                  <a:tcPr/>
-                </a:tc>
-                <a:tc>
-                  <a:txBody>
-                    <a:bodyPr/>
-                    <a:lstStyle/>
-                    <a:p>
-                      <a:r>
-                        <a:rPr sz="1600"/>
-                        <a:t>0%</a:t>
-                      </a:r>
-                    </a:p>
-                  </a:txBody>
-                  <a:tcPr/>
-                </a:tc>
-                <a:tc>
-                  <a:txBody>
-                    <a:bodyPr/>
-                    <a:lstStyle/>
-                    <a:p>
-                      <a:r>
-                        <a:rPr sz="1600"/>
-                        <a:t>16%</a:t>
-                      </a:r>
-                    </a:p>
-                  </a:txBody>
-                  <a:tcPr/>
-                </a:tc>
-                <a:tc>
-                  <a:txBody>
-                    <a:bodyPr/>
-                    <a:lstStyle/>
-                    <a:p>
-                      <a:r>
-                        <a:rPr sz="1600"/>
-                        <a:t>27%</a:t>
                       </a:r>
                     </a:p>
                   </a:txBody>
@@ -6176,6 +6176,19 @@
                     <a:p>
                       <a:r>
                         <a:rPr sz="1600"/>
+                        <a:t>44%</a:t>
+                      </a:r>
+                    </a:p>
+                  </a:txBody>
+                  <a:tcPr/>
+                </a:tc>
+                <a:tc>
+                  <a:txBody>
+                    <a:bodyPr/>
+                    <a:lstStyle/>
+                    <a:p>
+                      <a:r>
+                        <a:rPr sz="1600"/>
                         <a:t>0%</a:t>
                       </a:r>
                     </a:p>
@@ -6189,46 +6202,33 @@
                     <a:p>
                       <a:r>
                         <a:rPr sz="1600"/>
+                        <a:t>55%</a:t>
+                      </a:r>
+                    </a:p>
+                  </a:txBody>
+                  <a:tcPr/>
+                </a:tc>
+                <a:tc>
+                  <a:txBody>
+                    <a:bodyPr/>
+                    <a:lstStyle/>
+                    <a:p>
+                      <a:r>
+                        <a:rPr sz="1600"/>
+                        <a:t>43%</a:t>
+                      </a:r>
+                    </a:p>
+                  </a:txBody>
+                  <a:tcPr/>
+                </a:tc>
+                <a:tc>
+                  <a:txBody>
+                    <a:bodyPr/>
+                    <a:lstStyle/>
+                    <a:p>
+                      <a:r>
+                        <a:rPr sz="1600"/>
                         <a:t>51%</a:t>
-                      </a:r>
-                    </a:p>
-                  </a:txBody>
-                  <a:tcPr/>
-                </a:tc>
-                <a:tc>
-                  <a:txBody>
-                    <a:bodyPr/>
-                    <a:lstStyle/>
-                    <a:p>
-                      <a:r>
-                        <a:rPr sz="1600"/>
-                        <a:t>83%</a:t>
-                      </a:r>
-                    </a:p>
-                  </a:txBody>
-                  <a:tcPr/>
-                </a:tc>
-                <a:tc>
-                  <a:txBody>
-                    <a:bodyPr/>
-                    <a:lstStyle/>
-                    <a:p>
-                      <a:r>
-                        <a:rPr sz="1600"/>
-                        <a:t>55%</a:t>
-                      </a:r>
-                    </a:p>
-                  </a:txBody>
-                  <a:tcPr/>
-                </a:tc>
-                <a:tc>
-                  <a:txBody>
-                    <a:bodyPr/>
-                    <a:lstStyle/>
-                    <a:p>
-                      <a:r>
-                        <a:rPr sz="1600"/>
-                        <a:t>32%</a:t>
                       </a:r>
                     </a:p>
                   </a:txBody>
@@ -6256,7 +6256,7 @@
                     <a:p>
                       <a:r>
                         <a:rPr sz="1600"/>
-                        <a:t>0%</a:t>
+                        <a:t>100%</a:t>
                       </a:r>
                     </a:p>
                   </a:txBody>
@@ -6448,59 +6448,59 @@
                     <a:p>
                       <a:r>
                         <a:rPr sz="1600"/>
+                        <a:t>Arcolab</a:t>
+                      </a:r>
+                    </a:p>
+                  </a:txBody>
+                  <a:tcPr/>
+                </a:tc>
+                <a:tc>
+                  <a:txBody>
+                    <a:bodyPr/>
+                    <a:lstStyle/>
+                    <a:p>
+                      <a:r>
+                        <a:rPr sz="1600"/>
+                        <a:t>Ucl</a:t>
+                      </a:r>
+                    </a:p>
+                  </a:txBody>
+                  <a:tcPr/>
+                </a:tc>
+                <a:tc>
+                  <a:txBody>
+                    <a:bodyPr/>
+                    <a:lstStyle/>
+                    <a:p>
+                      <a:r>
+                        <a:rPr sz="1600"/>
+                        <a:t>Spg</a:t>
+                      </a:r>
+                    </a:p>
+                  </a:txBody>
+                  <a:tcPr/>
+                </a:tc>
+                <a:tc>
+                  <a:txBody>
+                    <a:bodyPr/>
+                    <a:lstStyle/>
+                    <a:p>
+                      <a:r>
+                        <a:rPr sz="1600"/>
+                        <a:t>Krsg</a:t>
+                      </a:r>
+                    </a:p>
+                  </a:txBody>
+                  <a:tcPr/>
+                </a:tc>
+                <a:tc>
+                  <a:txBody>
+                    <a:bodyPr/>
+                    <a:lstStyle/>
+                    <a:p>
+                      <a:r>
+                        <a:rPr sz="1600"/>
                         <a:t>Corporate</a:t>
-                      </a:r>
-                    </a:p>
-                  </a:txBody>
-                  <a:tcPr/>
-                </a:tc>
-                <a:tc>
-                  <a:txBody>
-                    <a:bodyPr/>
-                    <a:lstStyle/>
-                    <a:p>
-                      <a:r>
-                        <a:rPr sz="1600"/>
-                        <a:t>Seml</a:t>
-                      </a:r>
-                    </a:p>
-                  </a:txBody>
-                  <a:tcPr/>
-                </a:tc>
-                <a:tc>
-                  <a:txBody>
-                    <a:bodyPr/>
-                    <a:lstStyle/>
-                    <a:p>
-                      <a:r>
-                        <a:rPr sz="1600"/>
-                        <a:t>Other</a:t>
-                      </a:r>
-                    </a:p>
-                  </a:txBody>
-                  <a:tcPr/>
-                </a:tc>
-                <a:tc>
-                  <a:txBody>
-                    <a:bodyPr/>
-                    <a:lstStyle/>
-                    <a:p>
-                      <a:r>
-                        <a:rPr sz="1600"/>
-                        <a:t>Ucl</a:t>
-                      </a:r>
-                    </a:p>
-                  </a:txBody>
-                  <a:tcPr/>
-                </a:tc>
-                <a:tc>
-                  <a:txBody>
-                    <a:bodyPr/>
-                    <a:lstStyle/>
-                    <a:p>
-                      <a:r>
-                        <a:rPr sz="1600"/>
-                        <a:t>Alathur</a:t>
                       </a:r>
                     </a:p>
                   </a:txBody>
@@ -6528,59 +6528,59 @@
                     <a:p>
                       <a:r>
                         <a:rPr sz="1600"/>
+                        <a:t>0%</a:t>
+                      </a:r>
+                    </a:p>
+                  </a:txBody>
+                  <a:tcPr/>
+                </a:tc>
+                <a:tc>
+                  <a:txBody>
+                    <a:bodyPr/>
+                    <a:lstStyle/>
+                    <a:p>
+                      <a:r>
+                        <a:rPr sz="1600"/>
+                        <a:t>0%</a:t>
+                      </a:r>
+                    </a:p>
+                  </a:txBody>
+                  <a:tcPr/>
+                </a:tc>
+                <a:tc>
+                  <a:txBody>
+                    <a:bodyPr/>
+                    <a:lstStyle/>
+                    <a:p>
+                      <a:r>
+                        <a:rPr sz="1600"/>
+                        <a:t>0%</a:t>
+                      </a:r>
+                    </a:p>
+                  </a:txBody>
+                  <a:tcPr/>
+                </a:tc>
+                <a:tc>
+                  <a:txBody>
+                    <a:bodyPr/>
+                    <a:lstStyle/>
+                    <a:p>
+                      <a:r>
+                        <a:rPr sz="1600"/>
+                        <a:t>36%</a:t>
+                      </a:r>
+                    </a:p>
+                  </a:txBody>
+                  <a:tcPr/>
+                </a:tc>
+                <a:tc>
+                  <a:txBody>
+                    <a:bodyPr/>
+                    <a:lstStyle/>
+                    <a:p>
+                      <a:r>
+                        <a:rPr sz="1600"/>
                         <a:t>100%</a:t>
-                      </a:r>
-                    </a:p>
-                  </a:txBody>
-                  <a:tcPr/>
-                </a:tc>
-                <a:tc>
-                  <a:txBody>
-                    <a:bodyPr/>
-                    <a:lstStyle/>
-                    <a:p>
-                      <a:r>
-                        <a:rPr sz="1600"/>
-                        <a:t>0%</a:t>
-                      </a:r>
-                    </a:p>
-                  </a:txBody>
-                  <a:tcPr/>
-                </a:tc>
-                <a:tc>
-                  <a:txBody>
-                    <a:bodyPr/>
-                    <a:lstStyle/>
-                    <a:p>
-                      <a:r>
-                        <a:rPr sz="1600"/>
-                        <a:t>0%</a:t>
-                      </a:r>
-                    </a:p>
-                  </a:txBody>
-                  <a:tcPr/>
-                </a:tc>
-                <a:tc>
-                  <a:txBody>
-                    <a:bodyPr/>
-                    <a:lstStyle/>
-                    <a:p>
-                      <a:r>
-                        <a:rPr sz="1600"/>
-                        <a:t>0%</a:t>
-                      </a:r>
-                    </a:p>
-                  </a:txBody>
-                  <a:tcPr/>
-                </a:tc>
-                <a:tc>
-                  <a:txBody>
-                    <a:bodyPr/>
-                    <a:lstStyle/>
-                    <a:p>
-                      <a:r>
-                        <a:rPr sz="1600"/>
-                        <a:t>50%</a:t>
                       </a:r>
                     </a:p>
                   </a:txBody>
@@ -6647,20 +6647,20 @@
                     <a:p>
                       <a:r>
                         <a:rPr sz="1600"/>
+                        <a:t>6%</a:t>
+                      </a:r>
+                    </a:p>
+                  </a:txBody>
+                  <a:tcPr/>
+                </a:tc>
+                <a:tc>
+                  <a:txBody>
+                    <a:bodyPr/>
+                    <a:lstStyle/>
+                    <a:p>
+                      <a:r>
+                        <a:rPr sz="1600"/>
                         <a:t>0%</a:t>
-                      </a:r>
-                    </a:p>
-                  </a:txBody>
-                  <a:tcPr/>
-                </a:tc>
-                <a:tc>
-                  <a:txBody>
-                    <a:bodyPr/>
-                    <a:lstStyle/>
-                    <a:p>
-                      <a:r>
-                        <a:rPr sz="1600"/>
-                        <a:t>50%</a:t>
                       </a:r>
                     </a:p>
                   </a:txBody>
@@ -6688,6 +6688,32 @@
                     <a:p>
                       <a:r>
                         <a:rPr sz="1600"/>
+                        <a:t>100%</a:t>
+                      </a:r>
+                    </a:p>
+                  </a:txBody>
+                  <a:tcPr/>
+                </a:tc>
+                <a:tc>
+                  <a:txBody>
+                    <a:bodyPr/>
+                    <a:lstStyle/>
+                    <a:p>
+                      <a:r>
+                        <a:rPr sz="1600"/>
+                        <a:t>100%</a:t>
+                      </a:r>
+                    </a:p>
+                  </a:txBody>
+                  <a:tcPr/>
+                </a:tc>
+                <a:tc>
+                  <a:txBody>
+                    <a:bodyPr/>
+                    <a:lstStyle/>
+                    <a:p>
+                      <a:r>
+                        <a:rPr sz="1600"/>
                         <a:t>0%</a:t>
                       </a:r>
                     </a:p>
@@ -6701,33 +6727,7 @@
                     <a:p>
                       <a:r>
                         <a:rPr sz="1600"/>
-                        <a:t>0%</a:t>
-                      </a:r>
-                    </a:p>
-                  </a:txBody>
-                  <a:tcPr/>
-                </a:tc>
-                <a:tc>
-                  <a:txBody>
-                    <a:bodyPr/>
-                    <a:lstStyle/>
-                    <a:p>
-                      <a:r>
-                        <a:rPr sz="1600"/>
-                        <a:t>0%</a:t>
-                      </a:r>
-                    </a:p>
-                  </a:txBody>
-                  <a:tcPr/>
-                </a:tc>
-                <a:tc>
-                  <a:txBody>
-                    <a:bodyPr/>
-                    <a:lstStyle/>
-                    <a:p>
-                      <a:r>
-                        <a:rPr sz="1600"/>
-                        <a:t>100%</a:t>
+                        <a:t>58%</a:t>
                       </a:r>
                     </a:p>
                   </a:txBody>
@@ -6781,7 +6781,7 @@
                     <a:p>
                       <a:r>
                         <a:rPr sz="1600"/>
-                        <a:t>0%</a:t>
+                        <a:t>100%</a:t>
                       </a:r>
                     </a:p>
                   </a:txBody>
@@ -6878,7 +6878,46 @@
                     <a:p>
                       <a:r>
                         <a:rPr sz="1600"/>
-                        <a:t>Spg</a:t>
+                        <a:t>Seml</a:t>
+                      </a:r>
+                    </a:p>
+                  </a:txBody>
+                  <a:tcPr/>
+                </a:tc>
+                <a:tc>
+                  <a:txBody>
+                    <a:bodyPr/>
+                    <a:lstStyle/>
+                    <a:p>
+                      <a:r>
+                        <a:rPr sz="1600"/>
+                        <a:t>Other</a:t>
+                      </a:r>
+                    </a:p>
+                  </a:txBody>
+                  <a:tcPr/>
+                </a:tc>
+                <a:tc>
+                  <a:txBody>
+                    <a:bodyPr/>
+                    <a:lstStyle/>
+                    <a:p>
+                      <a:r>
+                        <a:rPr sz="1600"/>
+                        <a:t>R&amp;d</a:t>
+                      </a:r>
+                    </a:p>
+                  </a:txBody>
+                  <a:tcPr/>
+                </a:tc>
+                <a:tc>
+                  <a:txBody>
+                    <a:bodyPr/>
+                    <a:lstStyle/>
+                    <a:p>
+                      <a:r>
+                        <a:rPr sz="1600"/>
+                        <a:t>Alathur</a:t>
                       </a:r>
                     </a:p>
                   </a:txBody>
@@ -6892,45 +6931,6 @@
                       <a:r>
                         <a:rPr sz="1600"/>
                         <a:t>Pondy formulations</a:t>
-                      </a:r>
-                    </a:p>
-                  </a:txBody>
-                  <a:tcPr/>
-                </a:tc>
-                <a:tc>
-                  <a:txBody>
-                    <a:bodyPr/>
-                    <a:lstStyle/>
-                    <a:p>
-                      <a:r>
-                        <a:rPr sz="1600"/>
-                        <a:t>Arcolab</a:t>
-                      </a:r>
-                    </a:p>
-                  </a:txBody>
-                  <a:tcPr/>
-                </a:tc>
-                <a:tc>
-                  <a:txBody>
-                    <a:bodyPr/>
-                    <a:lstStyle/>
-                    <a:p>
-                      <a:r>
-                        <a:rPr sz="1600"/>
-                        <a:t>R&amp;d</a:t>
-                      </a:r>
-                    </a:p>
-                  </a:txBody>
-                  <a:tcPr/>
-                </a:tc>
-                <a:tc>
-                  <a:txBody>
-                    <a:bodyPr/>
-                    <a:lstStyle/>
-                    <a:p>
-                      <a:r>
-                        <a:rPr sz="1600"/>
-                        <a:t>Krsg</a:t>
                       </a:r>
                     </a:p>
                   </a:txBody>
@@ -6971,46 +6971,46 @@
                     <a:p>
                       <a:r>
                         <a:rPr sz="1600"/>
+                        <a:t>0%</a:t>
+                      </a:r>
+                    </a:p>
+                  </a:txBody>
+                  <a:tcPr/>
+                </a:tc>
+                <a:tc>
+                  <a:txBody>
+                    <a:bodyPr/>
+                    <a:lstStyle/>
+                    <a:p>
+                      <a:r>
+                        <a:rPr sz="1600"/>
+                        <a:t>0%</a:t>
+                      </a:r>
+                    </a:p>
+                  </a:txBody>
+                  <a:tcPr/>
+                </a:tc>
+                <a:tc>
+                  <a:txBody>
+                    <a:bodyPr/>
+                    <a:lstStyle/>
+                    <a:p>
+                      <a:r>
+                        <a:rPr sz="1600"/>
+                        <a:t>50%</a:t>
+                      </a:r>
+                    </a:p>
+                  </a:txBody>
+                  <a:tcPr/>
+                </a:tc>
+                <a:tc>
+                  <a:txBody>
+                    <a:bodyPr/>
+                    <a:lstStyle/>
+                    <a:p>
+                      <a:r>
+                        <a:rPr sz="1600"/>
                         <a:t>21%</a:t>
-                      </a:r>
-                    </a:p>
-                  </a:txBody>
-                  <a:tcPr/>
-                </a:tc>
-                <a:tc>
-                  <a:txBody>
-                    <a:bodyPr/>
-                    <a:lstStyle/>
-                    <a:p>
-                      <a:r>
-                        <a:rPr sz="1600"/>
-                        <a:t>0%</a:t>
-                      </a:r>
-                    </a:p>
-                  </a:txBody>
-                  <a:tcPr/>
-                </a:tc>
-                <a:tc>
-                  <a:txBody>
-                    <a:bodyPr/>
-                    <a:lstStyle/>
-                    <a:p>
-                      <a:r>
-                        <a:rPr sz="1600"/>
-                        <a:t>0%</a:t>
-                      </a:r>
-                    </a:p>
-                  </a:txBody>
-                  <a:tcPr/>
-                </a:tc>
-                <a:tc>
-                  <a:txBody>
-                    <a:bodyPr/>
-                    <a:lstStyle/>
-                    <a:p>
-                      <a:r>
-                        <a:rPr sz="1600"/>
-                        <a:t>36%</a:t>
                       </a:r>
                     </a:p>
                   </a:txBody>
@@ -7051,46 +7051,46 @@
                     <a:p>
                       <a:r>
                         <a:rPr sz="1600"/>
+                        <a:t>0%</a:t>
+                      </a:r>
+                    </a:p>
+                  </a:txBody>
+                  <a:tcPr/>
+                </a:tc>
+                <a:tc>
+                  <a:txBody>
+                    <a:bodyPr/>
+                    <a:lstStyle/>
+                    <a:p>
+                      <a:r>
+                        <a:rPr sz="1600"/>
+                        <a:t>0%</a:t>
+                      </a:r>
+                    </a:p>
+                  </a:txBody>
+                  <a:tcPr/>
+                </a:tc>
+                <a:tc>
+                  <a:txBody>
+                    <a:bodyPr/>
+                    <a:lstStyle/>
+                    <a:p>
+                      <a:r>
+                        <a:rPr sz="1600"/>
+                        <a:t>50%</a:t>
+                      </a:r>
+                    </a:p>
+                  </a:txBody>
+                  <a:tcPr/>
+                </a:tc>
+                <a:tc>
+                  <a:txBody>
+                    <a:bodyPr/>
+                    <a:lstStyle/>
+                    <a:p>
+                      <a:r>
+                        <a:rPr sz="1600"/>
                         <a:t>5%</a:t>
-                      </a:r>
-                    </a:p>
-                  </a:txBody>
-                  <a:tcPr/>
-                </a:tc>
-                <a:tc>
-                  <a:txBody>
-                    <a:bodyPr/>
-                    <a:lstStyle/>
-                    <a:p>
-                      <a:r>
-                        <a:rPr sz="1600"/>
-                        <a:t>0%</a:t>
-                      </a:r>
-                    </a:p>
-                  </a:txBody>
-                  <a:tcPr/>
-                </a:tc>
-                <a:tc>
-                  <a:txBody>
-                    <a:bodyPr/>
-                    <a:lstStyle/>
-                    <a:p>
-                      <a:r>
-                        <a:rPr sz="1600"/>
-                        <a:t>0%</a:t>
-                      </a:r>
-                    </a:p>
-                  </a:txBody>
-                  <a:tcPr/>
-                </a:tc>
-                <a:tc>
-                  <a:txBody>
-                    <a:bodyPr/>
-                    <a:lstStyle/>
-                    <a:p>
-                      <a:r>
-                        <a:rPr sz="1600"/>
-                        <a:t>6%</a:t>
                       </a:r>
                     </a:p>
                   </a:txBody>
@@ -7131,46 +7131,46 @@
                     <a:p>
                       <a:r>
                         <a:rPr sz="1600"/>
+                        <a:t>0%</a:t>
+                      </a:r>
+                    </a:p>
+                  </a:txBody>
+                  <a:tcPr/>
+                </a:tc>
+                <a:tc>
+                  <a:txBody>
+                    <a:bodyPr/>
+                    <a:lstStyle/>
+                    <a:p>
+                      <a:r>
+                        <a:rPr sz="1600"/>
+                        <a:t>100%</a:t>
+                      </a:r>
+                    </a:p>
+                  </a:txBody>
+                  <a:tcPr/>
+                </a:tc>
+                <a:tc>
+                  <a:txBody>
+                    <a:bodyPr/>
+                    <a:lstStyle/>
+                    <a:p>
+                      <a:r>
+                        <a:rPr sz="1600"/>
+                        <a:t>0%</a:t>
+                      </a:r>
+                    </a:p>
+                  </a:txBody>
+                  <a:tcPr/>
+                </a:tc>
+                <a:tc>
+                  <a:txBody>
+                    <a:bodyPr/>
+                    <a:lstStyle/>
+                    <a:p>
+                      <a:r>
+                        <a:rPr sz="1600"/>
                         <a:t>74%</a:t>
-                      </a:r>
-                    </a:p>
-                  </a:txBody>
-                  <a:tcPr/>
-                </a:tc>
-                <a:tc>
-                  <a:txBody>
-                    <a:bodyPr/>
-                    <a:lstStyle/>
-                    <a:p>
-                      <a:r>
-                        <a:rPr sz="1600"/>
-                        <a:t>100%</a:t>
-                      </a:r>
-                    </a:p>
-                  </a:txBody>
-                  <a:tcPr/>
-                </a:tc>
-                <a:tc>
-                  <a:txBody>
-                    <a:bodyPr/>
-                    <a:lstStyle/>
-                    <a:p>
-                      <a:r>
-                        <a:rPr sz="1600"/>
-                        <a:t>100%</a:t>
-                      </a:r>
-                    </a:p>
-                  </a:txBody>
-                  <a:tcPr/>
-                </a:tc>
-                <a:tc>
-                  <a:txBody>
-                    <a:bodyPr/>
-                    <a:lstStyle/>
-                    <a:p>
-                      <a:r>
-                        <a:rPr sz="1600"/>
-                        <a:t>58%</a:t>
                       </a:r>
                     </a:p>
                   </a:txBody>
@@ -7211,7 +7211,7 @@
                     <a:p>
                       <a:r>
                         <a:rPr sz="1600"/>
-                        <a:t>100%</a:t>
+                        <a:t>0%</a:t>
                       </a:r>
                     </a:p>
                   </a:txBody>
@@ -8504,6 +8504,30 @@
                     <a:lstStyle/>
                     <a:p>
                       <a:r>
+                        <a:t>1</a:t>
+                      </a:r>
+                    </a:p>
+                  </a:txBody>
+                  <a:tcPr/>
+                </a:tc>
+                <a:tc>
+                  <a:txBody>
+                    <a:bodyPr/>
+                    <a:lstStyle/>
+                    <a:p>
+                      <a:r>
+                        <a:t>15</a:t>
+                      </a:r>
+                    </a:p>
+                  </a:txBody>
+                  <a:tcPr/>
+                </a:tc>
+                <a:tc>
+                  <a:txBody>
+                    <a:bodyPr/>
+                    <a:lstStyle/>
+                    <a:p>
+                      <a:r>
                         <a:t>0</a:t>
                       </a:r>
                     </a:p>
@@ -8516,43 +8540,19 @@
                     <a:lstStyle/>
                     <a:p>
                       <a:r>
-                        <a:t>0</a:t>
-                      </a:r>
-                    </a:p>
-                  </a:txBody>
-                  <a:tcPr/>
-                </a:tc>
-                <a:tc>
-                  <a:txBody>
-                    <a:bodyPr/>
-                    <a:lstStyle/>
-                    <a:p>
-                      <a:r>
-                        <a:t>0</a:t>
-                      </a:r>
-                    </a:p>
-                  </a:txBody>
-                  <a:tcPr/>
-                </a:tc>
-                <a:tc>
-                  <a:txBody>
-                    <a:bodyPr/>
-                    <a:lstStyle/>
-                    <a:p>
-                      <a:r>
-                        <a:t>0</a:t>
-                      </a:r>
-                    </a:p>
-                  </a:txBody>
-                  <a:tcPr/>
-                </a:tc>
-                <a:tc>
-                  <a:txBody>
-                    <a:bodyPr/>
-                    <a:lstStyle/>
-                    <a:p>
-                      <a:r>
-                        <a:t>0</a:t>
+                        <a:t>1</a:t>
+                      </a:r>
+                    </a:p>
+                  </a:txBody>
+                  <a:tcPr/>
+                </a:tc>
+                <a:tc>
+                  <a:txBody>
+                    <a:bodyPr/>
+                    <a:lstStyle/>
+                    <a:p>
+                      <a:r>
+                        <a:t>6</a:t>
                       </a:r>
                     </a:p>
                   </a:txBody>
@@ -8578,55 +8578,55 @@
                     <a:lstStyle/>
                     <a:p>
                       <a:r>
-                        <a:t>0</a:t>
-                      </a:r>
-                    </a:p>
-                  </a:txBody>
-                  <a:tcPr/>
-                </a:tc>
-                <a:tc>
-                  <a:txBody>
-                    <a:bodyPr/>
-                    <a:lstStyle/>
-                    <a:p>
-                      <a:r>
-                        <a:t>0</a:t>
-                      </a:r>
-                    </a:p>
-                  </a:txBody>
-                  <a:tcPr/>
-                </a:tc>
-                <a:tc>
-                  <a:txBody>
-                    <a:bodyPr/>
-                    <a:lstStyle/>
-                    <a:p>
-                      <a:r>
-                        <a:t>0</a:t>
-                      </a:r>
-                    </a:p>
-                  </a:txBody>
-                  <a:tcPr/>
-                </a:tc>
-                <a:tc>
-                  <a:txBody>
-                    <a:bodyPr/>
-                    <a:lstStyle/>
-                    <a:p>
-                      <a:r>
-                        <a:t>0</a:t>
-                      </a:r>
-                    </a:p>
-                  </a:txBody>
-                  <a:tcPr/>
-                </a:tc>
-                <a:tc>
-                  <a:txBody>
-                    <a:bodyPr/>
-                    <a:lstStyle/>
-                    <a:p>
-                      <a:r>
-                        <a:t>0</a:t>
+                        <a:t>9</a:t>
+                      </a:r>
+                    </a:p>
+                  </a:txBody>
+                  <a:tcPr/>
+                </a:tc>
+                <a:tc>
+                  <a:txBody>
+                    <a:bodyPr/>
+                    <a:lstStyle/>
+                    <a:p>
+                      <a:r>
+                        <a:t>160</a:t>
+                      </a:r>
+                    </a:p>
+                  </a:txBody>
+                  <a:tcPr/>
+                </a:tc>
+                <a:tc>
+                  <a:txBody>
+                    <a:bodyPr/>
+                    <a:lstStyle/>
+                    <a:p>
+                      <a:r>
+                        <a:t>6</a:t>
+                      </a:r>
+                    </a:p>
+                  </a:txBody>
+                  <a:tcPr/>
+                </a:tc>
+                <a:tc>
+                  <a:txBody>
+                    <a:bodyPr/>
+                    <a:lstStyle/>
+                    <a:p>
+                      <a:r>
+                        <a:t>9</a:t>
+                      </a:r>
+                    </a:p>
+                  </a:txBody>
+                  <a:tcPr/>
+                </a:tc>
+                <a:tc>
+                  <a:txBody>
+                    <a:bodyPr/>
+                    <a:lstStyle/>
+                    <a:p>
+                      <a:r>
+                        <a:t>98</a:t>
                       </a:r>
                     </a:p>
                   </a:txBody>
@@ -8886,43 +8886,43 @@
                     <a:lstStyle/>
                     <a:p>
                       <a:r>
-                        <a:t>0</a:t>
-                      </a:r>
-                    </a:p>
-                  </a:txBody>
-                  <a:tcPr/>
-                </a:tc>
-                <a:tc>
-                  <a:txBody>
-                    <a:bodyPr/>
-                    <a:lstStyle/>
-                    <a:p>
-                      <a:r>
-                        <a:t>0</a:t>
-                      </a:r>
-                    </a:p>
-                  </a:txBody>
-                  <a:tcPr/>
-                </a:tc>
-                <a:tc>
-                  <a:txBody>
-                    <a:bodyPr/>
-                    <a:lstStyle/>
-                    <a:p>
-                      <a:r>
-                        <a:t>0</a:t>
-                      </a:r>
-                    </a:p>
-                  </a:txBody>
-                  <a:tcPr/>
-                </a:tc>
-                <a:tc>
-                  <a:txBody>
-                    <a:bodyPr/>
-                    <a:lstStyle/>
-                    <a:p>
-                      <a:r>
-                        <a:t>0</a:t>
+                        <a:t>97</a:t>
+                      </a:r>
+                    </a:p>
+                  </a:txBody>
+                  <a:tcPr/>
+                </a:tc>
+                <a:tc>
+                  <a:txBody>
+                    <a:bodyPr/>
+                    <a:lstStyle/>
+                    <a:p>
+                      <a:r>
+                        <a:t>3</a:t>
+                      </a:r>
+                    </a:p>
+                  </a:txBody>
+                  <a:tcPr/>
+                </a:tc>
+                <a:tc>
+                  <a:txBody>
+                    <a:bodyPr/>
+                    <a:lstStyle/>
+                    <a:p>
+                      <a:r>
+                        <a:t>3</a:t>
+                      </a:r>
+                    </a:p>
+                  </a:txBody>
+                  <a:tcPr/>
+                </a:tc>
+                <a:tc>
+                  <a:txBody>
+                    <a:bodyPr/>
+                    <a:lstStyle/>
+                    <a:p>
+                      <a:r>
+                        <a:t>44</a:t>
                       </a:r>
                     </a:p>
                   </a:txBody>
@@ -8960,43 +8960,43 @@
                     <a:lstStyle/>
                     <a:p>
                       <a:r>
-                        <a:t>0</a:t>
-                      </a:r>
-                    </a:p>
-                  </a:txBody>
-                  <a:tcPr/>
-                </a:tc>
-                <a:tc>
-                  <a:txBody>
-                    <a:bodyPr/>
-                    <a:lstStyle/>
-                    <a:p>
-                      <a:r>
-                        <a:t>0</a:t>
-                      </a:r>
-                    </a:p>
-                  </a:txBody>
-                  <a:tcPr/>
-                </a:tc>
-                <a:tc>
-                  <a:txBody>
-                    <a:bodyPr/>
-                    <a:lstStyle/>
-                    <a:p>
-                      <a:r>
-                        <a:t>0</a:t>
-                      </a:r>
-                    </a:p>
-                  </a:txBody>
-                  <a:tcPr/>
-                </a:tc>
-                <a:tc>
-                  <a:txBody>
-                    <a:bodyPr/>
-                    <a:lstStyle/>
-                    <a:p>
-                      <a:r>
-                        <a:t>0</a:t>
+                        <a:t>44</a:t>
+                      </a:r>
+                    </a:p>
+                  </a:txBody>
+                  <a:tcPr/>
+                </a:tc>
+                <a:tc>
+                  <a:txBody>
+                    <a:bodyPr/>
+                    <a:lstStyle/>
+                    <a:p>
+                      <a:r>
+                        <a:t>1</a:t>
+                      </a:r>
+                    </a:p>
+                  </a:txBody>
+                  <a:tcPr/>
+                </a:tc>
+                <a:tc>
+                  <a:txBody>
+                    <a:bodyPr/>
+                    <a:lstStyle/>
+                    <a:p>
+                      <a:r>
+                        <a:t>7</a:t>
+                      </a:r>
+                    </a:p>
+                  </a:txBody>
+                  <a:tcPr/>
+                </a:tc>
+                <a:tc>
+                  <a:txBody>
+                    <a:bodyPr/>
+                    <a:lstStyle/>
+                    <a:p>
+                      <a:r>
+                        <a:t>13</a:t>
                       </a:r>
                     </a:p>
                   </a:txBody>
@@ -9034,6 +9034,30 @@
                     <a:lstStyle/>
                     <a:p>
                       <a:r>
+                        <a:t>21</a:t>
+                      </a:r>
+                    </a:p>
+                  </a:txBody>
+                  <a:tcPr/>
+                </a:tc>
+                <a:tc>
+                  <a:txBody>
+                    <a:bodyPr/>
+                    <a:lstStyle/>
+                    <a:p>
+                      <a:r>
+                        <a:t>4</a:t>
+                      </a:r>
+                    </a:p>
+                  </a:txBody>
+                  <a:tcPr/>
+                </a:tc>
+                <a:tc>
+                  <a:txBody>
+                    <a:bodyPr/>
+                    <a:lstStyle/>
+                    <a:p>
+                      <a:r>
                         <a:t>0</a:t>
                       </a:r>
                     </a:p>
@@ -9046,31 +9070,7 @@
                     <a:lstStyle/>
                     <a:p>
                       <a:r>
-                        <a:t>0</a:t>
-                      </a:r>
-                    </a:p>
-                  </a:txBody>
-                  <a:tcPr/>
-                </a:tc>
-                <a:tc>
-                  <a:txBody>
-                    <a:bodyPr/>
-                    <a:lstStyle/>
-                    <a:p>
-                      <a:r>
-                        <a:t>0</a:t>
-                      </a:r>
-                    </a:p>
-                  </a:txBody>
-                  <a:tcPr/>
-                </a:tc>
-                <a:tc>
-                  <a:txBody>
-                    <a:bodyPr/>
-                    <a:lstStyle/>
-                    <a:p>
-                      <a:r>
-                        <a:t>0</a:t>
+                        <a:t>9</a:t>
                       </a:r>
                     </a:p>
                   </a:txBody>
@@ -9096,55 +9096,55 @@
                     <a:lstStyle/>
                     <a:p>
                       <a:r>
-                        <a:t>0</a:t>
-                      </a:r>
-                    </a:p>
-                  </a:txBody>
-                  <a:tcPr/>
-                </a:tc>
-                <a:tc>
-                  <a:txBody>
-                    <a:bodyPr/>
-                    <a:lstStyle/>
-                    <a:p>
-                      <a:r>
-                        <a:t>58</a:t>
-                      </a:r>
-                    </a:p>
-                  </a:txBody>
-                  <a:tcPr/>
-                </a:tc>
-                <a:tc>
-                  <a:txBody>
-                    <a:bodyPr/>
-                    <a:lstStyle/>
-                    <a:p>
-                      <a:r>
-                        <a:t>18</a:t>
-                      </a:r>
-                    </a:p>
-                  </a:txBody>
-                  <a:tcPr/>
-                </a:tc>
-                <a:tc>
-                  <a:txBody>
-                    <a:bodyPr/>
-                    <a:lstStyle/>
-                    <a:p>
-                      <a:r>
-                        <a:t>1</a:t>
-                      </a:r>
-                    </a:p>
-                  </a:txBody>
-                  <a:tcPr/>
-                </a:tc>
-                <a:tc>
-                  <a:txBody>
-                    <a:bodyPr/>
-                    <a:lstStyle/>
-                    <a:p>
-                      <a:r>
-                        <a:t>26</a:t>
+                        <a:t>10</a:t>
+                      </a:r>
+                    </a:p>
+                  </a:txBody>
+                  <a:tcPr/>
+                </a:tc>
+                <a:tc>
+                  <a:txBody>
+                    <a:bodyPr/>
+                    <a:lstStyle/>
+                    <a:p>
+                      <a:r>
+                        <a:t>395</a:t>
+                      </a:r>
+                    </a:p>
+                  </a:txBody>
+                  <a:tcPr/>
+                </a:tc>
+                <a:tc>
+                  <a:txBody>
+                    <a:bodyPr/>
+                    <a:lstStyle/>
+                    <a:p>
+                      <a:r>
+                        <a:t>32</a:t>
+                      </a:r>
+                    </a:p>
+                  </a:txBody>
+                  <a:tcPr/>
+                </a:tc>
+                <a:tc>
+                  <a:txBody>
+                    <a:bodyPr/>
+                    <a:lstStyle/>
+                    <a:p>
+                      <a:r>
+                        <a:t>21</a:t>
+                      </a:r>
+                    </a:p>
+                  </a:txBody>
+                  <a:tcPr/>
+                </a:tc>
+                <a:tc>
+                  <a:txBody>
+                    <a:bodyPr/>
+                    <a:lstStyle/>
+                    <a:p>
+                      <a:r>
+                        <a:t>196</a:t>
                       </a:r>
                     </a:p>
                   </a:txBody>
@@ -9334,6 +9334,18 @@
                     <a:lstStyle/>
                     <a:p>
                       <a:r>
+                        <a:t>4</a:t>
+                      </a:r>
+                    </a:p>
+                  </a:txBody>
+                  <a:tcPr/>
+                </a:tc>
+                <a:tc>
+                  <a:txBody>
+                    <a:bodyPr/>
+                    <a:lstStyle/>
+                    <a:p>
+                      <a:r>
                         <a:t>0</a:t>
                       </a:r>
                     </a:p>
@@ -9358,19 +9370,7 @@
                     <a:lstStyle/>
                     <a:p>
                       <a:r>
-                        <a:t>0</a:t>
-                      </a:r>
-                    </a:p>
-                  </a:txBody>
-                  <a:tcPr/>
-                </a:tc>
-                <a:tc>
-                  <a:txBody>
-                    <a:bodyPr/>
-                    <a:lstStyle/>
-                    <a:p>
-                      <a:r>
-                        <a:t>0</a:t>
+                        <a:t>5</a:t>
                       </a:r>
                     </a:p>
                   </a:txBody>
@@ -9408,43 +9408,43 @@
                     <a:lstStyle/>
                     <a:p>
                       <a:r>
-                        <a:t>0</a:t>
-                      </a:r>
-                    </a:p>
-                  </a:txBody>
-                  <a:tcPr/>
-                </a:tc>
-                <a:tc>
-                  <a:txBody>
-                    <a:bodyPr/>
-                    <a:lstStyle/>
-                    <a:p>
-                      <a:r>
-                        <a:t>0</a:t>
-                      </a:r>
-                    </a:p>
-                  </a:txBody>
-                  <a:tcPr/>
-                </a:tc>
-                <a:tc>
-                  <a:txBody>
-                    <a:bodyPr/>
-                    <a:lstStyle/>
-                    <a:p>
-                      <a:r>
-                        <a:t>0</a:t>
-                      </a:r>
-                    </a:p>
-                  </a:txBody>
-                  <a:tcPr/>
-                </a:tc>
-                <a:tc>
-                  <a:txBody>
-                    <a:bodyPr/>
-                    <a:lstStyle/>
-                    <a:p>
-                      <a:r>
-                        <a:t>0</a:t>
+                        <a:t>33</a:t>
+                      </a:r>
+                    </a:p>
+                  </a:txBody>
+                  <a:tcPr/>
+                </a:tc>
+                <a:tc>
+                  <a:txBody>
+                    <a:bodyPr/>
+                    <a:lstStyle/>
+                    <a:p>
+                      <a:r>
+                        <a:t>13</a:t>
+                      </a:r>
+                    </a:p>
+                  </a:txBody>
+                  <a:tcPr/>
+                </a:tc>
+                <a:tc>
+                  <a:txBody>
+                    <a:bodyPr/>
+                    <a:lstStyle/>
+                    <a:p>
+                      <a:r>
+                        <a:t>15</a:t>
+                      </a:r>
+                    </a:p>
+                  </a:txBody>
+                  <a:tcPr/>
+                </a:tc>
+                <a:tc>
+                  <a:txBody>
+                    <a:bodyPr/>
+                    <a:lstStyle/>
+                    <a:p>
+                      <a:r>
+                        <a:t>257</a:t>
                       </a:r>
                     </a:p>
                   </a:txBody>
@@ -9704,43 +9704,43 @@
                     <a:lstStyle/>
                     <a:p>
                       <a:r>
-                        <a:t>0</a:t>
-                      </a:r>
-                    </a:p>
-                  </a:txBody>
-                  <a:tcPr/>
-                </a:tc>
-                <a:tc>
-                  <a:txBody>
-                    <a:bodyPr/>
-                    <a:lstStyle/>
-                    <a:p>
-                      <a:r>
-                        <a:t>0</a:t>
-                      </a:r>
-                    </a:p>
-                  </a:txBody>
-                  <a:tcPr/>
-                </a:tc>
-                <a:tc>
-                  <a:txBody>
-                    <a:bodyPr/>
-                    <a:lstStyle/>
-                    <a:p>
-                      <a:r>
-                        <a:t>0</a:t>
-                      </a:r>
-                    </a:p>
-                  </a:txBody>
-                  <a:tcPr/>
-                </a:tc>
-                <a:tc>
-                  <a:txBody>
-                    <a:bodyPr/>
-                    <a:lstStyle/>
-                    <a:p>
-                      <a:r>
-                        <a:t>0</a:t>
+                        <a:t>1</a:t>
+                      </a:r>
+                    </a:p>
+                  </a:txBody>
+                  <a:tcPr/>
+                </a:tc>
+                <a:tc>
+                  <a:txBody>
+                    <a:bodyPr/>
+                    <a:lstStyle/>
+                    <a:p>
+                      <a:r>
+                        <a:t>2</a:t>
+                      </a:r>
+                    </a:p>
+                  </a:txBody>
+                  <a:tcPr/>
+                </a:tc>
+                <a:tc>
+                  <a:txBody>
+                    <a:bodyPr/>
+                    <a:lstStyle/>
+                    <a:p>
+                      <a:r>
+                        <a:t>14</a:t>
+                      </a:r>
+                    </a:p>
+                  </a:txBody>
+                  <a:tcPr/>
+                </a:tc>
+                <a:tc>
+                  <a:txBody>
+                    <a:bodyPr/>
+                    <a:lstStyle/>
+                    <a:p>
+                      <a:r>
+                        <a:t>240</a:t>
                       </a:r>
                     </a:p>
                   </a:txBody>
@@ -9790,43 +9790,43 @@
                     <a:lstStyle/>
                     <a:p>
                       <a:r>
-                        <a:t>0</a:t>
-                      </a:r>
-                    </a:p>
-                  </a:txBody>
-                  <a:tcPr/>
-                </a:tc>
-                <a:tc>
-                  <a:txBody>
-                    <a:bodyPr/>
-                    <a:lstStyle/>
-                    <a:p>
-                      <a:r>
-                        <a:t>0</a:t>
-                      </a:r>
-                    </a:p>
-                  </a:txBody>
-                  <a:tcPr/>
-                </a:tc>
-                <a:tc>
-                  <a:txBody>
-                    <a:bodyPr/>
-                    <a:lstStyle/>
-                    <a:p>
-                      <a:r>
-                        <a:t>0</a:t>
-                      </a:r>
-                    </a:p>
-                  </a:txBody>
-                  <a:tcPr/>
-                </a:tc>
-                <a:tc>
-                  <a:txBody>
-                    <a:bodyPr/>
-                    <a:lstStyle/>
-                    <a:p>
-                      <a:r>
-                        <a:t>0</a:t>
+                        <a:t>2</a:t>
+                      </a:r>
+                    </a:p>
+                  </a:txBody>
+                  <a:tcPr/>
+                </a:tc>
+                <a:tc>
+                  <a:txBody>
+                    <a:bodyPr/>
+                    <a:lstStyle/>
+                    <a:p>
+                      <a:r>
+                        <a:t>12</a:t>
+                      </a:r>
+                    </a:p>
+                  </a:txBody>
+                  <a:tcPr/>
+                </a:tc>
+                <a:tc>
+                  <a:txBody>
+                    <a:bodyPr/>
+                    <a:lstStyle/>
+                    <a:p>
+                      <a:r>
+                        <a:t>70</a:t>
+                      </a:r>
+                    </a:p>
+                  </a:txBody>
+                  <a:tcPr/>
+                </a:tc>
+                <a:tc>
+                  <a:txBody>
+                    <a:bodyPr/>
+                    <a:lstStyle/>
+                    <a:p>
+                      <a:r>
+                        <a:t>1</a:t>
                       </a:r>
                     </a:p>
                   </a:txBody>
@@ -9876,19 +9876,19 @@
                     <a:lstStyle/>
                     <a:p>
                       <a:r>
-                        <a:t>0</a:t>
-                      </a:r>
-                    </a:p>
-                  </a:txBody>
-                  <a:tcPr/>
-                </a:tc>
-                <a:tc>
-                  <a:txBody>
-                    <a:bodyPr/>
-                    <a:lstStyle/>
-                    <a:p>
-                      <a:r>
-                        <a:t>0</a:t>
+                        <a:t>7</a:t>
+                      </a:r>
+                    </a:p>
+                  </a:txBody>
+                  <a:tcPr/>
+                </a:tc>
+                <a:tc>
+                  <a:txBody>
+                    <a:bodyPr/>
+                    <a:lstStyle/>
+                    <a:p>
+                      <a:r>
+                        <a:t>50</a:t>
                       </a:r>
                     </a:p>
                   </a:txBody>
@@ -9926,55 +9926,55 @@
                     <a:lstStyle/>
                     <a:p>
                       <a:r>
-                        <a:t>0</a:t>
-                      </a:r>
-                    </a:p>
-                  </a:txBody>
-                  <a:tcPr/>
-                </a:tc>
-                <a:tc>
-                  <a:txBody>
-                    <a:bodyPr/>
-                    <a:lstStyle/>
-                    <a:p>
-                      <a:r>
-                        <a:t>0</a:t>
-                      </a:r>
-                    </a:p>
-                  </a:txBody>
-                  <a:tcPr/>
-                </a:tc>
-                <a:tc>
-                  <a:txBody>
-                    <a:bodyPr/>
-                    <a:lstStyle/>
-                    <a:p>
-                      <a:r>
-                        <a:t>5</a:t>
-                      </a:r>
-                    </a:p>
-                  </a:txBody>
-                  <a:tcPr/>
-                </a:tc>
-                <a:tc>
-                  <a:txBody>
-                    <a:bodyPr/>
-                    <a:lstStyle/>
-                    <a:p>
-                      <a:r>
-                        <a:t>77</a:t>
-                      </a:r>
-                    </a:p>
-                  </a:txBody>
-                  <a:tcPr/>
-                </a:tc>
-                <a:tc>
-                  <a:txBody>
-                    <a:bodyPr/>
-                    <a:lstStyle/>
-                    <a:p>
-                      <a:r>
-                        <a:t>0</a:t>
+                        <a:t>38</a:t>
+                      </a:r>
+                    </a:p>
+                  </a:txBody>
+                  <a:tcPr/>
+                </a:tc>
+                <a:tc>
+                  <a:txBody>
+                    <a:bodyPr/>
+                    <a:lstStyle/>
+                    <a:p>
+                      <a:r>
+                        <a:t>17</a:t>
+                      </a:r>
+                    </a:p>
+                  </a:txBody>
+                  <a:tcPr/>
+                </a:tc>
+                <a:tc>
+                  <a:txBody>
+                    <a:bodyPr/>
+                    <a:lstStyle/>
+                    <a:p>
+                      <a:r>
+                        <a:t>53</a:t>
+                      </a:r>
+                    </a:p>
+                  </a:txBody>
+                  <a:tcPr/>
+                </a:tc>
+                <a:tc>
+                  <a:txBody>
+                    <a:bodyPr/>
+                    <a:lstStyle/>
+                    <a:p>
+                      <a:r>
+                        <a:t>699</a:t>
+                      </a:r>
+                    </a:p>
+                  </a:txBody>
+                  <a:tcPr/>
+                </a:tc>
+                <a:tc>
+                  <a:txBody>
+                    <a:bodyPr/>
+                    <a:lstStyle/>
+                    <a:p>
+                      <a:r>
+                        <a:t>1</a:t>
                       </a:r>
                     </a:p>
                   </a:txBody>
@@ -10238,55 +10238,55 @@
                     <a:lstStyle/>
                     <a:p>
                       <a:r>
-                        <a:t>0</a:t>
-                      </a:r>
-                    </a:p>
-                  </a:txBody>
-                  <a:tcPr/>
-                </a:tc>
-                <a:tc>
-                  <a:txBody>
-                    <a:bodyPr/>
-                    <a:lstStyle/>
-                    <a:p>
-                      <a:r>
-                        <a:t>0</a:t>
-                      </a:r>
-                    </a:p>
-                  </a:txBody>
-                  <a:tcPr/>
-                </a:tc>
-                <a:tc>
-                  <a:txBody>
-                    <a:bodyPr/>
-                    <a:lstStyle/>
-                    <a:p>
-                      <a:r>
-                        <a:t>0</a:t>
-                      </a:r>
-                    </a:p>
-                  </a:txBody>
-                  <a:tcPr/>
-                </a:tc>
-                <a:tc>
-                  <a:txBody>
-                    <a:bodyPr/>
-                    <a:lstStyle/>
-                    <a:p>
-                      <a:r>
-                        <a:t>0</a:t>
-                      </a:r>
-                    </a:p>
-                  </a:txBody>
-                  <a:tcPr/>
-                </a:tc>
-                <a:tc>
-                  <a:txBody>
-                    <a:bodyPr/>
-                    <a:lstStyle/>
-                    <a:p>
-                      <a:r>
-                        <a:t>0</a:t>
+                        <a:t>7</a:t>
+                      </a:r>
+                    </a:p>
+                  </a:txBody>
+                  <a:tcPr/>
+                </a:tc>
+                <a:tc>
+                  <a:txBody>
+                    <a:bodyPr/>
+                    <a:lstStyle/>
+                    <a:p>
+                      <a:r>
+                        <a:t>9</a:t>
+                      </a:r>
+                    </a:p>
+                  </a:txBody>
+                  <a:tcPr/>
+                </a:tc>
+                <a:tc>
+                  <a:txBody>
+                    <a:bodyPr/>
+                    <a:lstStyle/>
+                    <a:p>
+                      <a:r>
+                        <a:t>53</a:t>
+                      </a:r>
+                    </a:p>
+                  </a:txBody>
+                  <a:tcPr/>
+                </a:tc>
+                <a:tc>
+                  <a:txBody>
+                    <a:bodyPr/>
+                    <a:lstStyle/>
+                    <a:p>
+                      <a:r>
+                        <a:t>9</a:t>
+                      </a:r>
+                    </a:p>
+                  </a:txBody>
+                  <a:tcPr/>
+                </a:tc>
+                <a:tc>
+                  <a:txBody>
+                    <a:bodyPr/>
+                    <a:lstStyle/>
+                    <a:p>
+                      <a:r>
+                        <a:t>29</a:t>
                       </a:r>
                     </a:p>
                   </a:txBody>
@@ -10534,6 +10534,30 @@
                     <a:lstStyle/>
                     <a:p>
                       <a:r>
+                        <a:t>7</a:t>
+                      </a:r>
+                    </a:p>
+                  </a:txBody>
+                  <a:tcPr/>
+                </a:tc>
+                <a:tc>
+                  <a:txBody>
+                    <a:bodyPr/>
+                    <a:lstStyle/>
+                    <a:p>
+                      <a:r>
+                        <a:t>19</a:t>
+                      </a:r>
+                    </a:p>
+                  </a:txBody>
+                  <a:tcPr/>
+                </a:tc>
+                <a:tc>
+                  <a:txBody>
+                    <a:bodyPr/>
+                    <a:lstStyle/>
+                    <a:p>
+                      <a:r>
                         <a:t>0</a:t>
                       </a:r>
                     </a:p>
@@ -10546,43 +10570,19 @@
                     <a:lstStyle/>
                     <a:p>
                       <a:r>
-                        <a:t>0</a:t>
-                      </a:r>
-                    </a:p>
-                  </a:txBody>
-                  <a:tcPr/>
-                </a:tc>
-                <a:tc>
-                  <a:txBody>
-                    <a:bodyPr/>
-                    <a:lstStyle/>
-                    <a:p>
-                      <a:r>
-                        <a:t>0</a:t>
-                      </a:r>
-                    </a:p>
-                  </a:txBody>
-                  <a:tcPr/>
-                </a:tc>
-                <a:tc>
-                  <a:txBody>
-                    <a:bodyPr/>
-                    <a:lstStyle/>
-                    <a:p>
-                      <a:r>
-                        <a:t>0</a:t>
-                      </a:r>
-                    </a:p>
-                  </a:txBody>
-                  <a:tcPr/>
-                </a:tc>
-                <a:tc>
-                  <a:txBody>
-                    <a:bodyPr/>
-                    <a:lstStyle/>
-                    <a:p>
-                      <a:r>
-                        <a:t>0</a:t>
+                        <a:t>5</a:t>
+                      </a:r>
+                    </a:p>
+                  </a:txBody>
+                  <a:tcPr/>
+                </a:tc>
+                <a:tc>
+                  <a:txBody>
+                    <a:bodyPr/>
+                    <a:lstStyle/>
+                    <a:p>
+                      <a:r>
+                        <a:t>5</a:t>
                       </a:r>
                     </a:p>
                   </a:txBody>
@@ -10608,6 +10608,18 @@
                     <a:lstStyle/>
                     <a:p>
                       <a:r>
+                        <a:t>1</a:t>
+                      </a:r>
+                    </a:p>
+                  </a:txBody>
+                  <a:tcPr/>
+                </a:tc>
+                <a:tc>
+                  <a:txBody>
+                    <a:bodyPr/>
+                    <a:lstStyle/>
+                    <a:p>
+                      <a:r>
                         <a:t>0</a:t>
                       </a:r>
                     </a:p>
@@ -10632,19 +10644,7 @@
                     <a:lstStyle/>
                     <a:p>
                       <a:r>
-                        <a:t>0</a:t>
-                      </a:r>
-                    </a:p>
-                  </a:txBody>
-                  <a:tcPr/>
-                </a:tc>
-                <a:tc>
-                  <a:txBody>
-                    <a:bodyPr/>
-                    <a:lstStyle/>
-                    <a:p>
-                      <a:r>
-                        <a:t>0</a:t>
+                        <a:t>1</a:t>
                       </a:r>
                     </a:p>
                   </a:txBody>
@@ -10682,19 +10682,19 @@
                     <a:lstStyle/>
                     <a:p>
                       <a:r>
-                        <a:t>0</a:t>
-                      </a:r>
-                    </a:p>
-                  </a:txBody>
-                  <a:tcPr/>
-                </a:tc>
-                <a:tc>
-                  <a:txBody>
-                    <a:bodyPr/>
-                    <a:lstStyle/>
-                    <a:p>
-                      <a:r>
-                        <a:t>0</a:t>
+                        <a:t>1</a:t>
+                      </a:r>
+                    </a:p>
+                  </a:txBody>
+                  <a:tcPr/>
+                </a:tc>
+                <a:tc>
+                  <a:txBody>
+                    <a:bodyPr/>
+                    <a:lstStyle/>
+                    <a:p>
+                      <a:r>
+                        <a:t>2</a:t>
                       </a:r>
                     </a:p>
                   </a:txBody>
@@ -10756,55 +10756,55 @@
                     <a:lstStyle/>
                     <a:p>
                       <a:r>
-                        <a:t>15</a:t>
-                      </a:r>
-                    </a:p>
-                  </a:txBody>
-                  <a:tcPr/>
-                </a:tc>
-                <a:tc>
-                  <a:txBody>
-                    <a:bodyPr/>
-                    <a:lstStyle/>
-                    <a:p>
-                      <a:r>
-                        <a:t>2</a:t>
-                      </a:r>
-                    </a:p>
-                  </a:txBody>
-                  <a:tcPr/>
-                </a:tc>
-                <a:tc>
-                  <a:txBody>
-                    <a:bodyPr/>
-                    <a:lstStyle/>
-                    <a:p>
-                      <a:r>
-                        <a:t>0</a:t>
-                      </a:r>
-                    </a:p>
-                  </a:txBody>
-                  <a:tcPr/>
-                </a:tc>
-                <a:tc>
-                  <a:txBody>
-                    <a:bodyPr/>
-                    <a:lstStyle/>
-                    <a:p>
-                      <a:r>
-                        <a:t>1</a:t>
-                      </a:r>
-                    </a:p>
-                  </a:txBody>
-                  <a:tcPr/>
-                </a:tc>
-                <a:tc>
-                  <a:txBody>
-                    <a:bodyPr/>
-                    <a:lstStyle/>
-                    <a:p>
-                      <a:r>
-                        <a:t>5</a:t>
+                        <a:t>31</a:t>
+                      </a:r>
+                    </a:p>
+                  </a:txBody>
+                  <a:tcPr/>
+                </a:tc>
+                <a:tc>
+                  <a:txBody>
+                    <a:bodyPr/>
+                    <a:lstStyle/>
+                    <a:p>
+                      <a:r>
+                        <a:t>32</a:t>
+                      </a:r>
+                    </a:p>
+                  </a:txBody>
+                  <a:tcPr/>
+                </a:tc>
+                <a:tc>
+                  <a:txBody>
+                    <a:bodyPr/>
+                    <a:lstStyle/>
+                    <a:p>
+                      <a:r>
+                        <a:t>53</a:t>
+                      </a:r>
+                    </a:p>
+                  </a:txBody>
+                  <a:tcPr/>
+                </a:tc>
+                <a:tc>
+                  <a:txBody>
+                    <a:bodyPr/>
+                    <a:lstStyle/>
+                    <a:p>
+                      <a:r>
+                        <a:t>16</a:t>
+                      </a:r>
+                    </a:p>
+                  </a:txBody>
+                  <a:tcPr/>
+                </a:tc>
+                <a:tc>
+                  <a:txBody>
+                    <a:bodyPr/>
+                    <a:lstStyle/>
+                    <a:p>
+                      <a:r>
+                        <a:t>39</a:t>
                       </a:r>
                     </a:p>
                   </a:txBody>
@@ -10980,7 +10980,7 @@
                     <a:lstStyle/>
                     <a:p>
                       <a:r>
-                        <a:t>141</a:t>
+                        <a:t>109</a:t>
                       </a:r>
                     </a:p>
                   </a:txBody>
@@ -11030,7 +11030,7 @@
                     <a:lstStyle/>
                     <a:p>
                       <a:r>
-                        <a:t>957</a:t>
+                        <a:t>250</a:t>
                       </a:r>
                     </a:p>
                   </a:txBody>
@@ -11230,7 +11230,7 @@
                     <a:lstStyle/>
                     <a:p>
                       <a:r>
-                        <a:t>609</a:t>
+                        <a:t>169</a:t>
                       </a:r>
                     </a:p>
                   </a:txBody>
@@ -11280,7 +11280,7 @@
                     <a:lstStyle/>
                     <a:p>
                       <a:r>
-                        <a:t>198</a:t>
+                        <a:t>46</a:t>
                       </a:r>
                     </a:p>
                   </a:txBody>
@@ -11330,7 +11330,7 @@
                     <a:lstStyle/>
                     <a:p>
                       <a:r>
-                        <a:t>135</a:t>
+                        <a:t>41</a:t>
                       </a:r>
                     </a:p>
                   </a:txBody>
@@ -11380,7 +11380,7 @@
                     <a:lstStyle/>
                     <a:p>
                       <a:r>
-                        <a:t>2310</a:t>
+                        <a:t>885</a:t>
                       </a:r>
                     </a:p>
                   </a:txBody>
@@ -11594,7 +11594,7 @@
                     <a:lstStyle/>
                     <a:p>
                       <a:r>
-                        <a:t>0</a:t>
+                        <a:t>10</a:t>
                       </a:r>
                     </a:p>
                   </a:txBody>
@@ -11742,7 +11742,7 @@
                     <a:lstStyle/>
                     <a:p>
                       <a:r>
-                        <a:t>0</a:t>
+                        <a:t>10</a:t>
                       </a:r>
                     </a:p>
                   </a:txBody>
@@ -12004,7 +12004,7 @@
                     <a:lstStyle/>
                     <a:p>
                       <a:r>
-                        <a:t>0</a:t>
+                        <a:t>5</a:t>
                       </a:r>
                     </a:p>
                   </a:txBody>
@@ -12152,7 +12152,7 @@
                     <a:lstStyle/>
                     <a:p>
                       <a:r>
-                        <a:t>0</a:t>
+                        <a:t>5</a:t>
                       </a:r>
                     </a:p>
                   </a:txBody>

</xml_diff>